<commit_message>
Sugestões de melhoria na aula 3.
</commit_message>
<xml_diff>
--- a/images/ilustrações.pptx
+++ b/images/ilustrações.pptx
@@ -9,6 +9,7 @@
     <p:sldId id="257" r:id="rId3"/>
     <p:sldId id="258" r:id="rId4"/>
     <p:sldId id="259" r:id="rId5"/>
+    <p:sldId id="260" r:id="rId6"/>
   </p:sldIdLst>
   <p:sldSz cx="9144000" cy="6858000" type="screen4x3"/>
   <p:notesSz cx="6858000" cy="9144000"/>
@@ -110,6 +111,2702 @@
 </p:presentation>
 </file>
 
+<file path=ppt/diagrams/colors1.xml><?xml version="1.0" encoding="utf-8"?>
+<dgm:colorsDef xmlns:dgm="http://schemas.openxmlformats.org/drawingml/2006/diagram" xmlns:a="http://schemas.openxmlformats.org/drawingml/2006/main" uniqueId="urn:microsoft.com/office/officeart/2005/8/colors/accent6_5">
+  <dgm:title val=""/>
+  <dgm:desc val=""/>
+  <dgm:catLst>
+    <dgm:cat type="accent6" pri="11500"/>
+  </dgm:catLst>
+  <dgm:styleLbl name="node0">
+    <dgm:fillClrLst meth="cycle">
+      <a:schemeClr val="accent6">
+        <a:alpha val="80000"/>
+      </a:schemeClr>
+    </dgm:fillClrLst>
+    <dgm:linClrLst meth="repeat">
+      <a:schemeClr val="lt1"/>
+    </dgm:linClrLst>
+    <dgm:effectClrLst/>
+    <dgm:txLinClrLst/>
+    <dgm:txFillClrLst/>
+    <dgm:txEffectClrLst/>
+  </dgm:styleLbl>
+  <dgm:styleLbl name="alignNode1">
+    <dgm:fillClrLst>
+      <a:schemeClr val="accent6">
+        <a:alpha val="90000"/>
+      </a:schemeClr>
+      <a:schemeClr val="accent6">
+        <a:alpha val="50000"/>
+      </a:schemeClr>
+    </dgm:fillClrLst>
+    <dgm:linClrLst>
+      <a:schemeClr val="accent6">
+        <a:alpha val="90000"/>
+      </a:schemeClr>
+      <a:schemeClr val="accent6">
+        <a:alpha val="50000"/>
+      </a:schemeClr>
+    </dgm:linClrLst>
+    <dgm:effectClrLst/>
+    <dgm:txLinClrLst/>
+    <dgm:txFillClrLst/>
+    <dgm:txEffectClrLst/>
+  </dgm:styleLbl>
+  <dgm:styleLbl name="node1">
+    <dgm:fillClrLst>
+      <a:schemeClr val="accent6">
+        <a:alpha val="90000"/>
+      </a:schemeClr>
+      <a:schemeClr val="accent6">
+        <a:alpha val="50000"/>
+      </a:schemeClr>
+    </dgm:fillClrLst>
+    <dgm:linClrLst meth="repeat">
+      <a:schemeClr val="lt1"/>
+    </dgm:linClrLst>
+    <dgm:effectClrLst/>
+    <dgm:txLinClrLst/>
+    <dgm:txFillClrLst/>
+    <dgm:txEffectClrLst/>
+  </dgm:styleLbl>
+  <dgm:styleLbl name="lnNode1">
+    <dgm:fillClrLst>
+      <a:schemeClr val="accent6">
+        <a:shade val="90000"/>
+      </a:schemeClr>
+      <a:schemeClr val="accent6">
+        <a:tint val="50000"/>
+        <a:alpha val="50000"/>
+      </a:schemeClr>
+    </dgm:fillClrLst>
+    <dgm:linClrLst meth="repeat">
+      <a:schemeClr val="lt1"/>
+    </dgm:linClrLst>
+    <dgm:effectClrLst/>
+    <dgm:txLinClrLst/>
+    <dgm:txFillClrLst/>
+    <dgm:txEffectClrLst/>
+  </dgm:styleLbl>
+  <dgm:styleLbl name="vennNode1">
+    <dgm:fillClrLst>
+      <a:schemeClr val="accent6">
+        <a:shade val="80000"/>
+        <a:alpha val="50000"/>
+      </a:schemeClr>
+      <a:schemeClr val="accent6">
+        <a:alpha val="80000"/>
+      </a:schemeClr>
+    </dgm:fillClrLst>
+    <dgm:linClrLst meth="repeat">
+      <a:schemeClr val="lt1"/>
+    </dgm:linClrLst>
+    <dgm:effectClrLst/>
+    <dgm:txLinClrLst/>
+    <dgm:txFillClrLst/>
+    <dgm:txEffectClrLst/>
+  </dgm:styleLbl>
+  <dgm:styleLbl name="node2">
+    <dgm:fillClrLst>
+      <a:schemeClr val="accent6">
+        <a:alpha val="70000"/>
+      </a:schemeClr>
+    </dgm:fillClrLst>
+    <dgm:linClrLst meth="repeat">
+      <a:schemeClr val="lt1"/>
+    </dgm:linClrLst>
+    <dgm:effectClrLst/>
+    <dgm:txLinClrLst/>
+    <dgm:txFillClrLst/>
+    <dgm:txEffectClrLst/>
+  </dgm:styleLbl>
+  <dgm:styleLbl name="node3">
+    <dgm:fillClrLst>
+      <a:schemeClr val="accent6">
+        <a:alpha val="50000"/>
+      </a:schemeClr>
+    </dgm:fillClrLst>
+    <dgm:linClrLst meth="repeat">
+      <a:schemeClr val="lt1"/>
+    </dgm:linClrLst>
+    <dgm:effectClrLst/>
+    <dgm:txLinClrLst/>
+    <dgm:txFillClrLst/>
+    <dgm:txEffectClrLst/>
+  </dgm:styleLbl>
+  <dgm:styleLbl name="node4">
+    <dgm:fillClrLst>
+      <a:schemeClr val="accent6">
+        <a:alpha val="30000"/>
+      </a:schemeClr>
+    </dgm:fillClrLst>
+    <dgm:linClrLst meth="repeat">
+      <a:schemeClr val="lt1"/>
+    </dgm:linClrLst>
+    <dgm:effectClrLst/>
+    <dgm:txLinClrLst/>
+    <dgm:txFillClrLst/>
+    <dgm:txEffectClrLst/>
+  </dgm:styleLbl>
+  <dgm:styleLbl name="fgImgPlace1">
+    <dgm:fillClrLst>
+      <a:schemeClr val="accent6">
+        <a:tint val="50000"/>
+        <a:alpha val="90000"/>
+      </a:schemeClr>
+      <a:schemeClr val="accent6">
+        <a:tint val="20000"/>
+        <a:alpha val="50000"/>
+      </a:schemeClr>
+    </dgm:fillClrLst>
+    <dgm:linClrLst meth="repeat">
+      <a:schemeClr val="lt1"/>
+    </dgm:linClrLst>
+    <dgm:effectClrLst/>
+    <dgm:txLinClrLst/>
+    <dgm:txFillClrLst meth="repeat">
+      <a:schemeClr val="lt1"/>
+    </dgm:txFillClrLst>
+    <dgm:txEffectClrLst/>
+  </dgm:styleLbl>
+  <dgm:styleLbl name="alignImgPlace1">
+    <dgm:fillClrLst>
+      <a:schemeClr val="accent6">
+        <a:tint val="50000"/>
+      </a:schemeClr>
+      <a:schemeClr val="accent6">
+        <a:tint val="20000"/>
+      </a:schemeClr>
+    </dgm:fillClrLst>
+    <dgm:linClrLst meth="repeat">
+      <a:schemeClr val="lt1"/>
+    </dgm:linClrLst>
+    <dgm:effectClrLst/>
+    <dgm:txLinClrLst/>
+    <dgm:txFillClrLst meth="repeat">
+      <a:schemeClr val="lt1"/>
+    </dgm:txFillClrLst>
+    <dgm:txEffectClrLst/>
+  </dgm:styleLbl>
+  <dgm:styleLbl name="bgImgPlace1">
+    <dgm:fillClrLst>
+      <a:schemeClr val="accent6">
+        <a:tint val="50000"/>
+      </a:schemeClr>
+      <a:schemeClr val="accent6">
+        <a:tint val="20000"/>
+      </a:schemeClr>
+    </dgm:fillClrLst>
+    <dgm:linClrLst meth="repeat">
+      <a:schemeClr val="lt1"/>
+    </dgm:linClrLst>
+    <dgm:effectClrLst/>
+    <dgm:txLinClrLst/>
+    <dgm:txFillClrLst meth="repeat">
+      <a:schemeClr val="lt1"/>
+    </dgm:txFillClrLst>
+    <dgm:txEffectClrLst/>
+  </dgm:styleLbl>
+  <dgm:styleLbl name="sibTrans2D1">
+    <dgm:fillClrLst>
+      <a:schemeClr val="accent6">
+        <a:shade val="90000"/>
+      </a:schemeClr>
+      <a:schemeClr val="accent6">
+        <a:tint val="50000"/>
+      </a:schemeClr>
+    </dgm:fillClrLst>
+    <dgm:linClrLst>
+      <a:schemeClr val="accent6">
+        <a:shade val="90000"/>
+      </a:schemeClr>
+      <a:schemeClr val="accent6">
+        <a:tint val="50000"/>
+      </a:schemeClr>
+    </dgm:linClrLst>
+    <dgm:effectClrLst/>
+    <dgm:txLinClrLst/>
+    <dgm:txFillClrLst/>
+    <dgm:txEffectClrLst/>
+  </dgm:styleLbl>
+  <dgm:styleLbl name="fgSibTrans2D1">
+    <dgm:fillClrLst>
+      <a:schemeClr val="accent6">
+        <a:shade val="90000"/>
+      </a:schemeClr>
+      <a:schemeClr val="accent6">
+        <a:tint val="50000"/>
+      </a:schemeClr>
+    </dgm:fillClrLst>
+    <dgm:linClrLst>
+      <a:schemeClr val="accent6">
+        <a:shade val="90000"/>
+      </a:schemeClr>
+      <a:schemeClr val="accent6">
+        <a:tint val="50000"/>
+      </a:schemeClr>
+    </dgm:linClrLst>
+    <dgm:effectClrLst/>
+    <dgm:txLinClrLst/>
+    <dgm:txFillClrLst/>
+    <dgm:txEffectClrLst/>
+  </dgm:styleLbl>
+  <dgm:styleLbl name="bgSibTrans2D1">
+    <dgm:fillClrLst>
+      <a:schemeClr val="accent6">
+        <a:shade val="90000"/>
+      </a:schemeClr>
+      <a:schemeClr val="accent6">
+        <a:tint val="50000"/>
+      </a:schemeClr>
+    </dgm:fillClrLst>
+    <dgm:linClrLst>
+      <a:schemeClr val="accent6">
+        <a:shade val="90000"/>
+      </a:schemeClr>
+      <a:schemeClr val="accent6">
+        <a:tint val="50000"/>
+      </a:schemeClr>
+    </dgm:linClrLst>
+    <dgm:effectClrLst/>
+    <dgm:txLinClrLst/>
+    <dgm:txFillClrLst/>
+    <dgm:txEffectClrLst/>
+  </dgm:styleLbl>
+  <dgm:styleLbl name="sibTrans1D1">
+    <dgm:fillClrLst>
+      <a:schemeClr val="accent6">
+        <a:shade val="90000"/>
+      </a:schemeClr>
+      <a:schemeClr val="accent6">
+        <a:tint val="50000"/>
+      </a:schemeClr>
+    </dgm:fillClrLst>
+    <dgm:linClrLst>
+      <a:schemeClr val="accent6">
+        <a:shade val="90000"/>
+      </a:schemeClr>
+      <a:schemeClr val="accent6">
+        <a:tint val="50000"/>
+      </a:schemeClr>
+    </dgm:linClrLst>
+    <dgm:effectClrLst/>
+    <dgm:txLinClrLst/>
+    <dgm:txFillClrLst meth="repeat">
+      <a:schemeClr val="tx1"/>
+    </dgm:txFillClrLst>
+    <dgm:txEffectClrLst/>
+  </dgm:styleLbl>
+  <dgm:styleLbl name="callout">
+    <dgm:fillClrLst meth="repeat">
+      <a:schemeClr val="accent6"/>
+    </dgm:fillClrLst>
+    <dgm:linClrLst meth="repeat">
+      <a:schemeClr val="accent6"/>
+    </dgm:linClrLst>
+    <dgm:effectClrLst/>
+    <dgm:txLinClrLst/>
+    <dgm:txFillClrLst meth="repeat">
+      <a:schemeClr val="tx1"/>
+    </dgm:txFillClrLst>
+    <dgm:txEffectClrLst/>
+  </dgm:styleLbl>
+  <dgm:styleLbl name="asst0">
+    <dgm:fillClrLst meth="repeat">
+      <a:schemeClr val="accent6">
+        <a:alpha val="90000"/>
+      </a:schemeClr>
+    </dgm:fillClrLst>
+    <dgm:linClrLst meth="repeat">
+      <a:schemeClr val="lt1"/>
+    </dgm:linClrLst>
+    <dgm:effectClrLst/>
+    <dgm:txLinClrLst/>
+    <dgm:txFillClrLst/>
+    <dgm:txEffectClrLst/>
+  </dgm:styleLbl>
+  <dgm:styleLbl name="asst1">
+    <dgm:fillClrLst meth="repeat">
+      <a:schemeClr val="accent6">
+        <a:alpha val="90000"/>
+      </a:schemeClr>
+    </dgm:fillClrLst>
+    <dgm:linClrLst meth="repeat">
+      <a:schemeClr val="lt1"/>
+    </dgm:linClrLst>
+    <dgm:effectClrLst/>
+    <dgm:txLinClrLst/>
+    <dgm:txFillClrLst/>
+    <dgm:txEffectClrLst/>
+  </dgm:styleLbl>
+  <dgm:styleLbl name="asst2">
+    <dgm:fillClrLst>
+      <a:schemeClr val="accent6">
+        <a:alpha val="90000"/>
+      </a:schemeClr>
+    </dgm:fillClrLst>
+    <dgm:linClrLst meth="repeat">
+      <a:schemeClr val="lt1"/>
+    </dgm:linClrLst>
+    <dgm:effectClrLst/>
+    <dgm:txLinClrLst/>
+    <dgm:txFillClrLst/>
+    <dgm:txEffectClrLst/>
+  </dgm:styleLbl>
+  <dgm:styleLbl name="asst3">
+    <dgm:fillClrLst>
+      <a:schemeClr val="accent6">
+        <a:alpha val="70000"/>
+      </a:schemeClr>
+    </dgm:fillClrLst>
+    <dgm:linClrLst meth="repeat">
+      <a:schemeClr val="lt1"/>
+    </dgm:linClrLst>
+    <dgm:effectClrLst/>
+    <dgm:txLinClrLst/>
+    <dgm:txFillClrLst/>
+    <dgm:txEffectClrLst/>
+  </dgm:styleLbl>
+  <dgm:styleLbl name="asst4">
+    <dgm:fillClrLst>
+      <a:schemeClr val="accent6">
+        <a:alpha val="50000"/>
+      </a:schemeClr>
+    </dgm:fillClrLst>
+    <dgm:linClrLst meth="repeat">
+      <a:schemeClr val="lt1"/>
+    </dgm:linClrLst>
+    <dgm:effectClrLst/>
+    <dgm:txLinClrLst/>
+    <dgm:txFillClrLst/>
+    <dgm:txEffectClrLst/>
+  </dgm:styleLbl>
+  <dgm:styleLbl name="parChTrans2D1">
+    <dgm:fillClrLst meth="repeat">
+      <a:schemeClr val="accent6">
+        <a:shade val="80000"/>
+      </a:schemeClr>
+    </dgm:fillClrLst>
+    <dgm:linClrLst meth="repeat">
+      <a:schemeClr val="accent6">
+        <a:shade val="80000"/>
+      </a:schemeClr>
+    </dgm:linClrLst>
+    <dgm:effectClrLst/>
+    <dgm:txLinClrLst/>
+    <dgm:txFillClrLst/>
+    <dgm:txEffectClrLst/>
+  </dgm:styleLbl>
+  <dgm:styleLbl name="parChTrans2D2">
+    <dgm:fillClrLst meth="repeat">
+      <a:schemeClr val="accent6">
+        <a:tint val="90000"/>
+      </a:schemeClr>
+    </dgm:fillClrLst>
+    <dgm:linClrLst meth="repeat">
+      <a:schemeClr val="accent6">
+        <a:tint val="90000"/>
+      </a:schemeClr>
+    </dgm:linClrLst>
+    <dgm:effectClrLst/>
+    <dgm:txLinClrLst/>
+    <dgm:txFillClrLst/>
+    <dgm:txEffectClrLst/>
+  </dgm:styleLbl>
+  <dgm:styleLbl name="parChTrans2D3">
+    <dgm:fillClrLst meth="repeat">
+      <a:schemeClr val="accent6">
+        <a:tint val="70000"/>
+      </a:schemeClr>
+    </dgm:fillClrLst>
+    <dgm:linClrLst meth="repeat">
+      <a:schemeClr val="accent6">
+        <a:tint val="70000"/>
+      </a:schemeClr>
+    </dgm:linClrLst>
+    <dgm:effectClrLst/>
+    <dgm:txLinClrLst/>
+    <dgm:txFillClrLst/>
+    <dgm:txEffectClrLst/>
+  </dgm:styleLbl>
+  <dgm:styleLbl name="parChTrans2D4">
+    <dgm:fillClrLst meth="repeat">
+      <a:schemeClr val="accent6">
+        <a:tint val="50000"/>
+      </a:schemeClr>
+    </dgm:fillClrLst>
+    <dgm:linClrLst meth="repeat">
+      <a:schemeClr val="accent6">
+        <a:tint val="50000"/>
+      </a:schemeClr>
+    </dgm:linClrLst>
+    <dgm:effectClrLst/>
+    <dgm:txLinClrLst/>
+    <dgm:txFillClrLst meth="repeat">
+      <a:schemeClr val="dk1"/>
+    </dgm:txFillClrLst>
+    <dgm:txEffectClrLst/>
+  </dgm:styleLbl>
+  <dgm:styleLbl name="parChTrans1D1">
+    <dgm:fillClrLst meth="repeat">
+      <a:schemeClr val="accent6">
+        <a:shade val="80000"/>
+      </a:schemeClr>
+    </dgm:fillClrLst>
+    <dgm:linClrLst meth="repeat">
+      <a:schemeClr val="accent6">
+        <a:shade val="80000"/>
+      </a:schemeClr>
+    </dgm:linClrLst>
+    <dgm:effectClrLst/>
+    <dgm:txLinClrLst/>
+    <dgm:txFillClrLst meth="repeat">
+      <a:schemeClr val="tx1"/>
+    </dgm:txFillClrLst>
+    <dgm:txEffectClrLst/>
+  </dgm:styleLbl>
+  <dgm:styleLbl name="parChTrans1D2">
+    <dgm:fillClrLst meth="repeat">
+      <a:schemeClr val="accent6">
+        <a:tint val="90000"/>
+      </a:schemeClr>
+    </dgm:fillClrLst>
+    <dgm:linClrLst meth="repeat">
+      <a:schemeClr val="accent6">
+        <a:tint val="90000"/>
+      </a:schemeClr>
+    </dgm:linClrLst>
+    <dgm:effectClrLst/>
+    <dgm:txLinClrLst/>
+    <dgm:txFillClrLst meth="repeat">
+      <a:schemeClr val="tx1"/>
+    </dgm:txFillClrLst>
+    <dgm:txEffectClrLst/>
+  </dgm:styleLbl>
+  <dgm:styleLbl name="parChTrans1D3">
+    <dgm:fillClrLst meth="repeat">
+      <a:schemeClr val="accent6">
+        <a:tint val="70000"/>
+      </a:schemeClr>
+    </dgm:fillClrLst>
+    <dgm:linClrLst meth="repeat">
+      <a:schemeClr val="accent6">
+        <a:tint val="70000"/>
+      </a:schemeClr>
+    </dgm:linClrLst>
+    <dgm:effectClrLst/>
+    <dgm:txLinClrLst/>
+    <dgm:txFillClrLst meth="repeat">
+      <a:schemeClr val="tx1"/>
+    </dgm:txFillClrLst>
+    <dgm:txEffectClrLst/>
+  </dgm:styleLbl>
+  <dgm:styleLbl name="parChTrans1D4">
+    <dgm:fillClrLst meth="repeat">
+      <a:schemeClr val="accent6">
+        <a:tint val="50000"/>
+      </a:schemeClr>
+    </dgm:fillClrLst>
+    <dgm:linClrLst meth="repeat">
+      <a:schemeClr val="accent6">
+        <a:tint val="50000"/>
+      </a:schemeClr>
+    </dgm:linClrLst>
+    <dgm:effectClrLst/>
+    <dgm:txLinClrLst/>
+    <dgm:txFillClrLst meth="repeat">
+      <a:schemeClr val="tx1"/>
+    </dgm:txFillClrLst>
+    <dgm:txEffectClrLst/>
+  </dgm:styleLbl>
+  <dgm:styleLbl name="fgAcc1">
+    <dgm:fillClrLst meth="repeat">
+      <a:schemeClr val="lt1">
+        <a:alpha val="90000"/>
+      </a:schemeClr>
+    </dgm:fillClrLst>
+    <dgm:linClrLst>
+      <a:schemeClr val="accent6">
+        <a:alpha val="90000"/>
+      </a:schemeClr>
+      <a:schemeClr val="accent6">
+        <a:alpha val="50000"/>
+      </a:schemeClr>
+    </dgm:linClrLst>
+    <dgm:effectClrLst/>
+    <dgm:txLinClrLst/>
+    <dgm:txFillClrLst meth="repeat">
+      <a:schemeClr val="dk1"/>
+    </dgm:txFillClrLst>
+    <dgm:txEffectClrLst/>
+  </dgm:styleLbl>
+  <dgm:styleLbl name="conFgAcc1">
+    <dgm:fillClrLst meth="repeat">
+      <a:schemeClr val="lt1">
+        <a:alpha val="90000"/>
+      </a:schemeClr>
+    </dgm:fillClrLst>
+    <dgm:linClrLst>
+      <a:schemeClr val="accent6">
+        <a:alpha val="90000"/>
+      </a:schemeClr>
+      <a:schemeClr val="accent6">
+        <a:alpha val="50000"/>
+      </a:schemeClr>
+    </dgm:linClrLst>
+    <dgm:effectClrLst/>
+    <dgm:txLinClrLst/>
+    <dgm:txFillClrLst meth="repeat">
+      <a:schemeClr val="dk1"/>
+    </dgm:txFillClrLst>
+    <dgm:txEffectClrLst/>
+  </dgm:styleLbl>
+  <dgm:styleLbl name="alignAcc1">
+    <dgm:fillClrLst meth="repeat">
+      <a:schemeClr val="lt1">
+        <a:alpha val="90000"/>
+      </a:schemeClr>
+    </dgm:fillClrLst>
+    <dgm:linClrLst>
+      <a:schemeClr val="accent6">
+        <a:alpha val="90000"/>
+      </a:schemeClr>
+      <a:schemeClr val="accent6">
+        <a:alpha val="50000"/>
+      </a:schemeClr>
+    </dgm:linClrLst>
+    <dgm:effectClrLst/>
+    <dgm:txLinClrLst/>
+    <dgm:txFillClrLst meth="repeat">
+      <a:schemeClr val="dk1"/>
+    </dgm:txFillClrLst>
+    <dgm:txEffectClrLst/>
+  </dgm:styleLbl>
+  <dgm:styleLbl name="trAlignAcc1">
+    <dgm:fillClrLst meth="repeat">
+      <a:schemeClr val="lt1">
+        <a:alpha val="40000"/>
+      </a:schemeClr>
+    </dgm:fillClrLst>
+    <dgm:linClrLst>
+      <a:schemeClr val="accent6">
+        <a:alpha val="90000"/>
+      </a:schemeClr>
+      <a:schemeClr val="accent6">
+        <a:alpha val="50000"/>
+      </a:schemeClr>
+    </dgm:linClrLst>
+    <dgm:effectClrLst/>
+    <dgm:txLinClrLst/>
+    <dgm:txFillClrLst meth="repeat">
+      <a:schemeClr val="dk1"/>
+    </dgm:txFillClrLst>
+    <dgm:txEffectClrLst/>
+  </dgm:styleLbl>
+  <dgm:styleLbl name="bgAcc1">
+    <dgm:fillClrLst meth="repeat">
+      <a:schemeClr val="lt1">
+        <a:alpha val="90000"/>
+      </a:schemeClr>
+    </dgm:fillClrLst>
+    <dgm:linClrLst>
+      <a:schemeClr val="accent6">
+        <a:alpha val="90000"/>
+      </a:schemeClr>
+      <a:schemeClr val="accent6">
+        <a:alpha val="50000"/>
+      </a:schemeClr>
+    </dgm:linClrLst>
+    <dgm:effectClrLst/>
+    <dgm:txLinClrLst/>
+    <dgm:txFillClrLst meth="repeat">
+      <a:schemeClr val="dk1"/>
+    </dgm:txFillClrLst>
+    <dgm:txEffectClrLst/>
+  </dgm:styleLbl>
+  <dgm:styleLbl name="solidFgAcc1">
+    <dgm:fillClrLst meth="repeat">
+      <a:schemeClr val="lt1"/>
+    </dgm:fillClrLst>
+    <dgm:linClrLst>
+      <a:schemeClr val="accent6">
+        <a:alpha val="90000"/>
+      </a:schemeClr>
+      <a:schemeClr val="accent6">
+        <a:alpha val="50000"/>
+      </a:schemeClr>
+    </dgm:linClrLst>
+    <dgm:effectClrLst/>
+    <dgm:txLinClrLst/>
+    <dgm:txFillClrLst meth="repeat">
+      <a:schemeClr val="dk1"/>
+    </dgm:txFillClrLst>
+    <dgm:txEffectClrLst/>
+  </dgm:styleLbl>
+  <dgm:styleLbl name="solidAlignAcc1">
+    <dgm:fillClrLst meth="repeat">
+      <a:schemeClr val="lt1"/>
+    </dgm:fillClrLst>
+    <dgm:linClrLst meth="repeat">
+      <a:schemeClr val="accent6"/>
+    </dgm:linClrLst>
+    <dgm:effectClrLst/>
+    <dgm:txLinClrLst/>
+    <dgm:txFillClrLst meth="repeat">
+      <a:schemeClr val="dk1"/>
+    </dgm:txFillClrLst>
+    <dgm:txEffectClrLst/>
+  </dgm:styleLbl>
+  <dgm:styleLbl name="solidBgAcc1">
+    <dgm:fillClrLst meth="repeat">
+      <a:schemeClr val="lt1"/>
+    </dgm:fillClrLst>
+    <dgm:linClrLst meth="repeat">
+      <a:schemeClr val="accent6"/>
+    </dgm:linClrLst>
+    <dgm:effectClrLst/>
+    <dgm:txLinClrLst/>
+    <dgm:txFillClrLst meth="repeat">
+      <a:schemeClr val="dk1"/>
+    </dgm:txFillClrLst>
+    <dgm:txEffectClrLst/>
+  </dgm:styleLbl>
+  <dgm:styleLbl name="fgAccFollowNode1">
+    <dgm:fillClrLst>
+      <a:schemeClr val="accent6">
+        <a:alpha val="90000"/>
+        <a:tint val="40000"/>
+      </a:schemeClr>
+      <a:schemeClr val="accent6">
+        <a:alpha val="50000"/>
+        <a:tint val="40000"/>
+      </a:schemeClr>
+    </dgm:fillClrLst>
+    <dgm:linClrLst meth="repeat">
+      <a:schemeClr val="accent6">
+        <a:alpha val="90000"/>
+        <a:tint val="40000"/>
+      </a:schemeClr>
+    </dgm:linClrLst>
+    <dgm:effectClrLst/>
+    <dgm:txLinClrLst/>
+    <dgm:txFillClrLst meth="repeat">
+      <a:schemeClr val="dk1"/>
+    </dgm:txFillClrLst>
+    <dgm:txEffectClrLst/>
+  </dgm:styleLbl>
+  <dgm:styleLbl name="alignAccFollowNode1">
+    <dgm:fillClrLst meth="repeat">
+      <a:schemeClr val="accent6">
+        <a:alpha val="90000"/>
+        <a:tint val="40000"/>
+      </a:schemeClr>
+    </dgm:fillClrLst>
+    <dgm:linClrLst meth="repeat">
+      <a:schemeClr val="accent6">
+        <a:alpha val="90000"/>
+        <a:tint val="40000"/>
+      </a:schemeClr>
+    </dgm:linClrLst>
+    <dgm:effectClrLst/>
+    <dgm:txLinClrLst/>
+    <dgm:txFillClrLst meth="repeat">
+      <a:schemeClr val="dk1"/>
+    </dgm:txFillClrLst>
+    <dgm:txEffectClrLst/>
+  </dgm:styleLbl>
+  <dgm:styleLbl name="bgAccFollowNode1">
+    <dgm:fillClrLst meth="repeat">
+      <a:schemeClr val="accent6">
+        <a:alpha val="90000"/>
+        <a:tint val="40000"/>
+      </a:schemeClr>
+    </dgm:fillClrLst>
+    <dgm:linClrLst meth="repeat">
+      <a:schemeClr val="lt1"/>
+    </dgm:linClrLst>
+    <dgm:effectClrLst/>
+    <dgm:txLinClrLst/>
+    <dgm:txFillClrLst meth="repeat">
+      <a:schemeClr val="dk1"/>
+    </dgm:txFillClrLst>
+    <dgm:txEffectClrLst/>
+  </dgm:styleLbl>
+  <dgm:styleLbl name="fgAcc0">
+    <dgm:fillClrLst meth="repeat">
+      <a:schemeClr val="lt1">
+        <a:alpha val="90000"/>
+      </a:schemeClr>
+    </dgm:fillClrLst>
+    <dgm:linClrLst meth="repeat">
+      <a:schemeClr val="accent6">
+        <a:shade val="80000"/>
+      </a:schemeClr>
+    </dgm:linClrLst>
+    <dgm:effectClrLst/>
+    <dgm:txLinClrLst/>
+    <dgm:txFillClrLst meth="repeat">
+      <a:schemeClr val="dk1"/>
+    </dgm:txFillClrLst>
+    <dgm:txEffectClrLst/>
+  </dgm:styleLbl>
+  <dgm:styleLbl name="fgAcc2">
+    <dgm:fillClrLst meth="repeat">
+      <a:schemeClr val="lt1">
+        <a:alpha val="90000"/>
+      </a:schemeClr>
+    </dgm:fillClrLst>
+    <dgm:linClrLst meth="repeat">
+      <a:schemeClr val="accent6">
+        <a:tint val="90000"/>
+      </a:schemeClr>
+    </dgm:linClrLst>
+    <dgm:effectClrLst/>
+    <dgm:txLinClrLst/>
+    <dgm:txFillClrLst meth="repeat">
+      <a:schemeClr val="dk1"/>
+    </dgm:txFillClrLst>
+    <dgm:txEffectClrLst/>
+  </dgm:styleLbl>
+  <dgm:styleLbl name="fgAcc3">
+    <dgm:fillClrLst meth="repeat">
+      <a:schemeClr val="lt1">
+        <a:alpha val="90000"/>
+      </a:schemeClr>
+    </dgm:fillClrLst>
+    <dgm:linClrLst meth="repeat">
+      <a:schemeClr val="accent6">
+        <a:tint val="70000"/>
+      </a:schemeClr>
+    </dgm:linClrLst>
+    <dgm:effectClrLst/>
+    <dgm:txLinClrLst/>
+    <dgm:txFillClrLst meth="repeat">
+      <a:schemeClr val="dk1"/>
+    </dgm:txFillClrLst>
+    <dgm:txEffectClrLst/>
+  </dgm:styleLbl>
+  <dgm:styleLbl name="fgAcc4">
+    <dgm:fillClrLst meth="repeat">
+      <a:schemeClr val="lt1">
+        <a:alpha val="90000"/>
+      </a:schemeClr>
+    </dgm:fillClrLst>
+    <dgm:linClrLst meth="repeat">
+      <a:schemeClr val="accent6">
+        <a:tint val="50000"/>
+      </a:schemeClr>
+    </dgm:linClrLst>
+    <dgm:effectClrLst/>
+    <dgm:txLinClrLst/>
+    <dgm:txFillClrLst meth="repeat">
+      <a:schemeClr val="dk1"/>
+    </dgm:txFillClrLst>
+    <dgm:txEffectClrLst/>
+  </dgm:styleLbl>
+  <dgm:styleLbl name="bgShp">
+    <dgm:fillClrLst meth="repeat">
+      <a:schemeClr val="accent6">
+        <a:tint val="40000"/>
+      </a:schemeClr>
+    </dgm:fillClrLst>
+    <dgm:linClrLst meth="repeat">
+      <a:schemeClr val="dk1"/>
+    </dgm:linClrLst>
+    <dgm:effectClrLst/>
+    <dgm:txLinClrLst/>
+    <dgm:txFillClrLst meth="repeat">
+      <a:schemeClr val="dk1"/>
+    </dgm:txFillClrLst>
+    <dgm:txEffectClrLst/>
+  </dgm:styleLbl>
+  <dgm:styleLbl name="dkBgShp">
+    <dgm:fillClrLst meth="repeat">
+      <a:schemeClr val="accent6">
+        <a:shade val="90000"/>
+      </a:schemeClr>
+    </dgm:fillClrLst>
+    <dgm:linClrLst meth="repeat">
+      <a:schemeClr val="dk1"/>
+    </dgm:linClrLst>
+    <dgm:effectClrLst/>
+    <dgm:txLinClrLst/>
+    <dgm:txFillClrLst meth="repeat">
+      <a:schemeClr val="lt1"/>
+    </dgm:txFillClrLst>
+    <dgm:txEffectClrLst/>
+  </dgm:styleLbl>
+  <dgm:styleLbl name="trBgShp">
+    <dgm:fillClrLst meth="repeat">
+      <a:schemeClr val="accent6">
+        <a:tint val="50000"/>
+        <a:alpha val="40000"/>
+      </a:schemeClr>
+    </dgm:fillClrLst>
+    <dgm:linClrLst meth="repeat">
+      <a:schemeClr val="accent6"/>
+    </dgm:linClrLst>
+    <dgm:effectClrLst/>
+    <dgm:txLinClrLst/>
+    <dgm:txFillClrLst meth="repeat">
+      <a:schemeClr val="lt1"/>
+    </dgm:txFillClrLst>
+    <dgm:txEffectClrLst/>
+  </dgm:styleLbl>
+  <dgm:styleLbl name="fgShp">
+    <dgm:fillClrLst meth="repeat">
+      <a:schemeClr val="accent6">
+        <a:tint val="40000"/>
+      </a:schemeClr>
+    </dgm:fillClrLst>
+    <dgm:linClrLst meth="repeat">
+      <a:schemeClr val="lt1"/>
+    </dgm:linClrLst>
+    <dgm:effectClrLst/>
+    <dgm:txLinClrLst/>
+    <dgm:txFillClrLst meth="repeat">
+      <a:schemeClr val="dk1"/>
+    </dgm:txFillClrLst>
+    <dgm:txEffectClrLst/>
+  </dgm:styleLbl>
+  <dgm:styleLbl name="revTx">
+    <dgm:fillClrLst meth="repeat">
+      <a:schemeClr val="lt1">
+        <a:alpha val="0"/>
+      </a:schemeClr>
+    </dgm:fillClrLst>
+    <dgm:linClrLst meth="repeat">
+      <a:schemeClr val="dk1">
+        <a:alpha val="0"/>
+      </a:schemeClr>
+    </dgm:linClrLst>
+    <dgm:effectClrLst/>
+    <dgm:txLinClrLst/>
+    <dgm:txFillClrLst meth="repeat">
+      <a:schemeClr val="tx1"/>
+    </dgm:txFillClrLst>
+    <dgm:txEffectClrLst/>
+  </dgm:styleLbl>
+</dgm:colorsDef>
+</file>
+
+<file path=ppt/diagrams/data1.xml><?xml version="1.0" encoding="utf-8"?>
+<dgm:dataModel xmlns:dgm="http://schemas.openxmlformats.org/drawingml/2006/diagram" xmlns:a="http://schemas.openxmlformats.org/drawingml/2006/main">
+  <dgm:ptLst>
+    <dgm:pt modelId="{E60828E9-F962-435B-836A-7C071FF5D6DB}" type="doc">
+      <dgm:prSet loTypeId="urn:microsoft.com/office/officeart/2005/8/layout/pyramid1" loCatId="pyramid" qsTypeId="urn:microsoft.com/office/officeart/2005/8/quickstyle/simple1" qsCatId="simple" csTypeId="urn:microsoft.com/office/officeart/2005/8/colors/accent6_5" csCatId="accent6" phldr="1"/>
+      <dgm:spPr/>
+    </dgm:pt>
+    <dgm:pt modelId="{F9685DB7-D5A6-4EB5-A758-E1C74F79C0BF}">
+      <dgm:prSet phldrT="[Texto]"/>
+      <dgm:spPr/>
+      <dgm:t>
+        <a:bodyPr/>
+        <a:lstStyle/>
+        <a:p>
+          <a:r>
+            <a:rPr lang="pt-BR" dirty="0" smtClean="0">
+              <a:solidFill>
+                <a:srgbClr val="333333"/>
+              </a:solidFill>
+            </a:rPr>
+            <a:t>Prazer</a:t>
+          </a:r>
+          <a:endParaRPr lang="pt-BR" dirty="0">
+            <a:solidFill>
+              <a:srgbClr val="333333"/>
+            </a:solidFill>
+          </a:endParaRPr>
+        </a:p>
+      </dgm:t>
+    </dgm:pt>
+    <dgm:pt modelId="{077094D4-8702-4899-8FF2-70D1E4A21903}" type="parTrans" cxnId="{54040936-408B-45CA-BDBE-2B72BCD172BF}">
+      <dgm:prSet/>
+      <dgm:spPr/>
+      <dgm:t>
+        <a:bodyPr/>
+        <a:lstStyle/>
+        <a:p>
+          <a:endParaRPr lang="pt-BR">
+            <a:solidFill>
+              <a:srgbClr val="333333"/>
+            </a:solidFill>
+          </a:endParaRPr>
+        </a:p>
+      </dgm:t>
+    </dgm:pt>
+    <dgm:pt modelId="{F61172F5-FEF6-48A7-89DA-C980A1049551}" type="sibTrans" cxnId="{54040936-408B-45CA-BDBE-2B72BCD172BF}">
+      <dgm:prSet/>
+      <dgm:spPr/>
+      <dgm:t>
+        <a:bodyPr/>
+        <a:lstStyle/>
+        <a:p>
+          <a:endParaRPr lang="pt-BR">
+            <a:solidFill>
+              <a:srgbClr val="333333"/>
+            </a:solidFill>
+          </a:endParaRPr>
+        </a:p>
+      </dgm:t>
+    </dgm:pt>
+    <dgm:pt modelId="{CAE98ECB-4165-4F12-98DD-4B39B1208AB4}">
+      <dgm:prSet phldrT="[Texto]"/>
+      <dgm:spPr/>
+      <dgm:t>
+        <a:bodyPr/>
+        <a:lstStyle/>
+        <a:p>
+          <a:r>
+            <a:rPr lang="pt-BR" dirty="0" smtClean="0">
+              <a:solidFill>
+                <a:srgbClr val="333333"/>
+              </a:solidFill>
+            </a:rPr>
+            <a:t>Usabilidade</a:t>
+          </a:r>
+          <a:endParaRPr lang="pt-BR" dirty="0">
+            <a:solidFill>
+              <a:srgbClr val="333333"/>
+            </a:solidFill>
+          </a:endParaRPr>
+        </a:p>
+      </dgm:t>
+    </dgm:pt>
+    <dgm:pt modelId="{B6A94A66-C7CA-4C66-9C90-871C07C9A8C9}" type="parTrans" cxnId="{7057895C-A740-4548-BDC1-DF0C33EA06A9}">
+      <dgm:prSet/>
+      <dgm:spPr/>
+      <dgm:t>
+        <a:bodyPr/>
+        <a:lstStyle/>
+        <a:p>
+          <a:endParaRPr lang="pt-BR">
+            <a:solidFill>
+              <a:srgbClr val="333333"/>
+            </a:solidFill>
+          </a:endParaRPr>
+        </a:p>
+      </dgm:t>
+    </dgm:pt>
+    <dgm:pt modelId="{DE9D11E2-2B54-451A-9A02-212F9131C5C3}" type="sibTrans" cxnId="{7057895C-A740-4548-BDC1-DF0C33EA06A9}">
+      <dgm:prSet/>
+      <dgm:spPr/>
+      <dgm:t>
+        <a:bodyPr/>
+        <a:lstStyle/>
+        <a:p>
+          <a:endParaRPr lang="pt-BR">
+            <a:solidFill>
+              <a:srgbClr val="333333"/>
+            </a:solidFill>
+          </a:endParaRPr>
+        </a:p>
+      </dgm:t>
+    </dgm:pt>
+    <dgm:pt modelId="{48675CE1-6845-4FB1-8128-6416E1200410}">
+      <dgm:prSet phldrT="[Texto]"/>
+      <dgm:spPr/>
+      <dgm:t>
+        <a:bodyPr/>
+        <a:lstStyle/>
+        <a:p>
+          <a:r>
+            <a:rPr lang="pt-BR" dirty="0" smtClean="0">
+              <a:solidFill>
+                <a:srgbClr val="333333"/>
+              </a:solidFill>
+            </a:rPr>
+            <a:t>Funcionalidade</a:t>
+          </a:r>
+          <a:endParaRPr lang="pt-BR" dirty="0">
+            <a:solidFill>
+              <a:srgbClr val="333333"/>
+            </a:solidFill>
+          </a:endParaRPr>
+        </a:p>
+      </dgm:t>
+    </dgm:pt>
+    <dgm:pt modelId="{63DAF5D8-FAFC-4707-9F9F-1B0021DD1C05}" type="parTrans" cxnId="{80519B9F-408D-49FC-993F-361D99EED3AB}">
+      <dgm:prSet/>
+      <dgm:spPr/>
+      <dgm:t>
+        <a:bodyPr/>
+        <a:lstStyle/>
+        <a:p>
+          <a:endParaRPr lang="pt-BR">
+            <a:solidFill>
+              <a:srgbClr val="333333"/>
+            </a:solidFill>
+          </a:endParaRPr>
+        </a:p>
+      </dgm:t>
+    </dgm:pt>
+    <dgm:pt modelId="{FCCC14D8-8A52-4F3A-ACE4-6D8FC1CCA514}" type="sibTrans" cxnId="{80519B9F-408D-49FC-993F-361D99EED3AB}">
+      <dgm:prSet/>
+      <dgm:spPr/>
+      <dgm:t>
+        <a:bodyPr/>
+        <a:lstStyle/>
+        <a:p>
+          <a:endParaRPr lang="pt-BR">
+            <a:solidFill>
+              <a:srgbClr val="333333"/>
+            </a:solidFill>
+          </a:endParaRPr>
+        </a:p>
+      </dgm:t>
+    </dgm:pt>
+    <dgm:pt modelId="{1F674C68-F0EF-4BEF-AB6C-D8EF68F18182}" type="pres">
+      <dgm:prSet presAssocID="{E60828E9-F962-435B-836A-7C071FF5D6DB}" presName="Name0" presStyleCnt="0">
+        <dgm:presLayoutVars>
+          <dgm:dir/>
+          <dgm:animLvl val="lvl"/>
+          <dgm:resizeHandles val="exact"/>
+        </dgm:presLayoutVars>
+      </dgm:prSet>
+      <dgm:spPr/>
+    </dgm:pt>
+    <dgm:pt modelId="{5852885B-8D50-4AB2-9C0E-DB5C16F4B9BF}" type="pres">
+      <dgm:prSet presAssocID="{F9685DB7-D5A6-4EB5-A758-E1C74F79C0BF}" presName="Name8" presStyleCnt="0"/>
+      <dgm:spPr/>
+    </dgm:pt>
+    <dgm:pt modelId="{17EE8B7C-693A-4BE4-A5D1-A602963EE13B}" type="pres">
+      <dgm:prSet presAssocID="{F9685DB7-D5A6-4EB5-A758-E1C74F79C0BF}" presName="level" presStyleLbl="node1" presStyleIdx="0" presStyleCnt="3">
+        <dgm:presLayoutVars>
+          <dgm:chMax val="1"/>
+          <dgm:bulletEnabled val="1"/>
+        </dgm:presLayoutVars>
+      </dgm:prSet>
+      <dgm:spPr/>
+    </dgm:pt>
+    <dgm:pt modelId="{06DF55A9-2328-48E6-8804-1A5AFC4F3494}" type="pres">
+      <dgm:prSet presAssocID="{F9685DB7-D5A6-4EB5-A758-E1C74F79C0BF}" presName="levelTx" presStyleLbl="revTx" presStyleIdx="0" presStyleCnt="0">
+        <dgm:presLayoutVars>
+          <dgm:chMax val="1"/>
+          <dgm:bulletEnabled val="1"/>
+        </dgm:presLayoutVars>
+      </dgm:prSet>
+      <dgm:spPr/>
+    </dgm:pt>
+    <dgm:pt modelId="{5440048C-8156-4891-8884-20AB948863AC}" type="pres">
+      <dgm:prSet presAssocID="{CAE98ECB-4165-4F12-98DD-4B39B1208AB4}" presName="Name8" presStyleCnt="0"/>
+      <dgm:spPr/>
+    </dgm:pt>
+    <dgm:pt modelId="{7413B943-16B8-46C6-A933-64E7C7E2DA5D}" type="pres">
+      <dgm:prSet presAssocID="{CAE98ECB-4165-4F12-98DD-4B39B1208AB4}" presName="level" presStyleLbl="node1" presStyleIdx="1" presStyleCnt="3">
+        <dgm:presLayoutVars>
+          <dgm:chMax val="1"/>
+          <dgm:bulletEnabled val="1"/>
+        </dgm:presLayoutVars>
+      </dgm:prSet>
+      <dgm:spPr/>
+    </dgm:pt>
+    <dgm:pt modelId="{CA2FB2EF-6EA2-4874-8A3B-BDCD65627878}" type="pres">
+      <dgm:prSet presAssocID="{CAE98ECB-4165-4F12-98DD-4B39B1208AB4}" presName="levelTx" presStyleLbl="revTx" presStyleIdx="0" presStyleCnt="0">
+        <dgm:presLayoutVars>
+          <dgm:chMax val="1"/>
+          <dgm:bulletEnabled val="1"/>
+        </dgm:presLayoutVars>
+      </dgm:prSet>
+      <dgm:spPr/>
+    </dgm:pt>
+    <dgm:pt modelId="{FE9136BD-E581-46F3-AD2D-712AF8074D7C}" type="pres">
+      <dgm:prSet presAssocID="{48675CE1-6845-4FB1-8128-6416E1200410}" presName="Name8" presStyleCnt="0"/>
+      <dgm:spPr/>
+    </dgm:pt>
+    <dgm:pt modelId="{A8FC50AC-6C59-436F-92BA-75264190A3CE}" type="pres">
+      <dgm:prSet presAssocID="{48675CE1-6845-4FB1-8128-6416E1200410}" presName="level" presStyleLbl="node1" presStyleIdx="2" presStyleCnt="3" custLinFactNeighborX="5276" custLinFactNeighborY="37361">
+        <dgm:presLayoutVars>
+          <dgm:chMax val="1"/>
+          <dgm:bulletEnabled val="1"/>
+        </dgm:presLayoutVars>
+      </dgm:prSet>
+      <dgm:spPr/>
+    </dgm:pt>
+    <dgm:pt modelId="{E495CC17-5F39-4020-BC78-D03B05DFCFB7}" type="pres">
+      <dgm:prSet presAssocID="{48675CE1-6845-4FB1-8128-6416E1200410}" presName="levelTx" presStyleLbl="revTx" presStyleIdx="0" presStyleCnt="0">
+        <dgm:presLayoutVars>
+          <dgm:chMax val="1"/>
+          <dgm:bulletEnabled val="1"/>
+        </dgm:presLayoutVars>
+      </dgm:prSet>
+      <dgm:spPr/>
+    </dgm:pt>
+  </dgm:ptLst>
+  <dgm:cxnLst>
+    <dgm:cxn modelId="{7057895C-A740-4548-BDC1-DF0C33EA06A9}" srcId="{E60828E9-F962-435B-836A-7C071FF5D6DB}" destId="{CAE98ECB-4165-4F12-98DD-4B39B1208AB4}" srcOrd="1" destOrd="0" parTransId="{B6A94A66-C7CA-4C66-9C90-871C07C9A8C9}" sibTransId="{DE9D11E2-2B54-451A-9A02-212F9131C5C3}"/>
+    <dgm:cxn modelId="{1AA83BD6-6751-4024-96BD-8A46B2E42C8D}" type="presOf" srcId="{CAE98ECB-4165-4F12-98DD-4B39B1208AB4}" destId="{7413B943-16B8-46C6-A933-64E7C7E2DA5D}" srcOrd="0" destOrd="0" presId="urn:microsoft.com/office/officeart/2005/8/layout/pyramid1"/>
+    <dgm:cxn modelId="{904E5E83-13F2-4ADA-9ED1-B5A135B41AB9}" type="presOf" srcId="{F9685DB7-D5A6-4EB5-A758-E1C74F79C0BF}" destId="{06DF55A9-2328-48E6-8804-1A5AFC4F3494}" srcOrd="1" destOrd="0" presId="urn:microsoft.com/office/officeart/2005/8/layout/pyramid1"/>
+    <dgm:cxn modelId="{780F0942-80E7-45CA-8959-72B6101065A7}" type="presOf" srcId="{F9685DB7-D5A6-4EB5-A758-E1C74F79C0BF}" destId="{17EE8B7C-693A-4BE4-A5D1-A602963EE13B}" srcOrd="0" destOrd="0" presId="urn:microsoft.com/office/officeart/2005/8/layout/pyramid1"/>
+    <dgm:cxn modelId="{80519B9F-408D-49FC-993F-361D99EED3AB}" srcId="{E60828E9-F962-435B-836A-7C071FF5D6DB}" destId="{48675CE1-6845-4FB1-8128-6416E1200410}" srcOrd="2" destOrd="0" parTransId="{63DAF5D8-FAFC-4707-9F9F-1B0021DD1C05}" sibTransId="{FCCC14D8-8A52-4F3A-ACE4-6D8FC1CCA514}"/>
+    <dgm:cxn modelId="{965E7C16-AB97-45B5-A65D-20349A43490C}" type="presOf" srcId="{48675CE1-6845-4FB1-8128-6416E1200410}" destId="{E495CC17-5F39-4020-BC78-D03B05DFCFB7}" srcOrd="1" destOrd="0" presId="urn:microsoft.com/office/officeart/2005/8/layout/pyramid1"/>
+    <dgm:cxn modelId="{54040936-408B-45CA-BDBE-2B72BCD172BF}" srcId="{E60828E9-F962-435B-836A-7C071FF5D6DB}" destId="{F9685DB7-D5A6-4EB5-A758-E1C74F79C0BF}" srcOrd="0" destOrd="0" parTransId="{077094D4-8702-4899-8FF2-70D1E4A21903}" sibTransId="{F61172F5-FEF6-48A7-89DA-C980A1049551}"/>
+    <dgm:cxn modelId="{770D53BD-E32A-48E7-B3A8-1B680D4C77AF}" type="presOf" srcId="{48675CE1-6845-4FB1-8128-6416E1200410}" destId="{A8FC50AC-6C59-436F-92BA-75264190A3CE}" srcOrd="0" destOrd="0" presId="urn:microsoft.com/office/officeart/2005/8/layout/pyramid1"/>
+    <dgm:cxn modelId="{043EE6C4-FAAF-4A81-BA0D-71B332872DC3}" type="presOf" srcId="{E60828E9-F962-435B-836A-7C071FF5D6DB}" destId="{1F674C68-F0EF-4BEF-AB6C-D8EF68F18182}" srcOrd="0" destOrd="0" presId="urn:microsoft.com/office/officeart/2005/8/layout/pyramid1"/>
+    <dgm:cxn modelId="{331FF3D2-9138-405A-B27A-B02D0FD513D8}" type="presOf" srcId="{CAE98ECB-4165-4F12-98DD-4B39B1208AB4}" destId="{CA2FB2EF-6EA2-4874-8A3B-BDCD65627878}" srcOrd="1" destOrd="0" presId="urn:microsoft.com/office/officeart/2005/8/layout/pyramid1"/>
+    <dgm:cxn modelId="{432935D5-880C-4AE9-84A6-22EF8314C8FA}" type="presParOf" srcId="{1F674C68-F0EF-4BEF-AB6C-D8EF68F18182}" destId="{5852885B-8D50-4AB2-9C0E-DB5C16F4B9BF}" srcOrd="0" destOrd="0" presId="urn:microsoft.com/office/officeart/2005/8/layout/pyramid1"/>
+    <dgm:cxn modelId="{5465BD7C-F6F6-4FF3-82DA-7396B68BAAAA}" type="presParOf" srcId="{5852885B-8D50-4AB2-9C0E-DB5C16F4B9BF}" destId="{17EE8B7C-693A-4BE4-A5D1-A602963EE13B}" srcOrd="0" destOrd="0" presId="urn:microsoft.com/office/officeart/2005/8/layout/pyramid1"/>
+    <dgm:cxn modelId="{9320ADD8-9325-4886-836A-FCB8CDC33649}" type="presParOf" srcId="{5852885B-8D50-4AB2-9C0E-DB5C16F4B9BF}" destId="{06DF55A9-2328-48E6-8804-1A5AFC4F3494}" srcOrd="1" destOrd="0" presId="urn:microsoft.com/office/officeart/2005/8/layout/pyramid1"/>
+    <dgm:cxn modelId="{D123B5E7-B7FD-4406-A9C7-5B5B120D5328}" type="presParOf" srcId="{1F674C68-F0EF-4BEF-AB6C-D8EF68F18182}" destId="{5440048C-8156-4891-8884-20AB948863AC}" srcOrd="1" destOrd="0" presId="urn:microsoft.com/office/officeart/2005/8/layout/pyramid1"/>
+    <dgm:cxn modelId="{07A7780B-D32B-494D-A529-3018480436A0}" type="presParOf" srcId="{5440048C-8156-4891-8884-20AB948863AC}" destId="{7413B943-16B8-46C6-A933-64E7C7E2DA5D}" srcOrd="0" destOrd="0" presId="urn:microsoft.com/office/officeart/2005/8/layout/pyramid1"/>
+    <dgm:cxn modelId="{0D1E2AD7-7B4E-4369-A31A-5121807D78CC}" type="presParOf" srcId="{5440048C-8156-4891-8884-20AB948863AC}" destId="{CA2FB2EF-6EA2-4874-8A3B-BDCD65627878}" srcOrd="1" destOrd="0" presId="urn:microsoft.com/office/officeart/2005/8/layout/pyramid1"/>
+    <dgm:cxn modelId="{E59C40B4-13CD-4A5A-A93B-61ACFE2D55A4}" type="presParOf" srcId="{1F674C68-F0EF-4BEF-AB6C-D8EF68F18182}" destId="{FE9136BD-E581-46F3-AD2D-712AF8074D7C}" srcOrd="2" destOrd="0" presId="urn:microsoft.com/office/officeart/2005/8/layout/pyramid1"/>
+    <dgm:cxn modelId="{268C5111-2C76-46F0-8EE0-BCAFEB8D0500}" type="presParOf" srcId="{FE9136BD-E581-46F3-AD2D-712AF8074D7C}" destId="{A8FC50AC-6C59-436F-92BA-75264190A3CE}" srcOrd="0" destOrd="0" presId="urn:microsoft.com/office/officeart/2005/8/layout/pyramid1"/>
+    <dgm:cxn modelId="{04182181-052F-4765-950E-CD0C3C947386}" type="presParOf" srcId="{FE9136BD-E581-46F3-AD2D-712AF8074D7C}" destId="{E495CC17-5F39-4020-BC78-D03B05DFCFB7}" srcOrd="1" destOrd="0" presId="urn:microsoft.com/office/officeart/2005/8/layout/pyramid1"/>
+  </dgm:cxnLst>
+  <dgm:bg/>
+  <dgm:whole/>
+  <dgm:extLst>
+    <a:ext uri="http://schemas.microsoft.com/office/drawing/2008/diagram">
+      <dsp:dataModelExt xmlns:dsp="http://schemas.microsoft.com/office/drawing/2008/diagram" relId="rId6" minVer="http://schemas.openxmlformats.org/drawingml/2006/diagram"/>
+    </a:ext>
+  </dgm:extLst>
+</dgm:dataModel>
+</file>
+
+<file path=ppt/diagrams/drawing1.xml><?xml version="1.0" encoding="utf-8"?>
+<dsp:drawing xmlns:dgm="http://schemas.openxmlformats.org/drawingml/2006/diagram" xmlns:dsp="http://schemas.microsoft.com/office/drawing/2008/diagram" xmlns:a="http://schemas.openxmlformats.org/drawingml/2006/main">
+  <dsp:spTree>
+    <dsp:nvGrpSpPr>
+      <dsp:cNvPr id="0" name=""/>
+      <dsp:cNvGrpSpPr/>
+    </dsp:nvGrpSpPr>
+    <dsp:grpSpPr/>
+    <dsp:sp modelId="{17EE8B7C-693A-4BE4-A5D1-A602963EE13B}">
+      <dsp:nvSpPr>
+        <dsp:cNvPr id="0" name=""/>
+        <dsp:cNvSpPr/>
+      </dsp:nvSpPr>
+      <dsp:spPr>
+        <a:xfrm>
+          <a:off x="1520380" y="0"/>
+          <a:ext cx="1520380" cy="919658"/>
+        </a:xfrm>
+        <a:prstGeom prst="trapezoid">
+          <a:avLst>
+            <a:gd name="adj" fmla="val 82660"/>
+          </a:avLst>
+        </a:prstGeom>
+        <a:solidFill>
+          <a:schemeClr val="accent6">
+            <a:alpha val="90000"/>
+            <a:hueOff val="0"/>
+            <a:satOff val="0"/>
+            <a:lumOff val="0"/>
+            <a:alphaOff val="0"/>
+          </a:schemeClr>
+        </a:solidFill>
+        <a:ln w="25400" cap="flat" cmpd="sng" algn="ctr">
+          <a:solidFill>
+            <a:schemeClr val="lt1">
+              <a:hueOff val="0"/>
+              <a:satOff val="0"/>
+              <a:lumOff val="0"/>
+              <a:alphaOff val="0"/>
+            </a:schemeClr>
+          </a:solidFill>
+          <a:prstDash val="solid"/>
+        </a:ln>
+        <a:effectLst/>
+      </dsp:spPr>
+      <dsp:style>
+        <a:lnRef idx="2">
+          <a:scrgbClr r="0" g="0" b="0"/>
+        </a:lnRef>
+        <a:fillRef idx="1">
+          <a:scrgbClr r="0" g="0" b="0"/>
+        </a:fillRef>
+        <a:effectRef idx="0">
+          <a:scrgbClr r="0" g="0" b="0"/>
+        </a:effectRef>
+        <a:fontRef idx="minor">
+          <a:schemeClr val="lt1"/>
+        </a:fontRef>
+      </dsp:style>
+      <dsp:txBody>
+        <a:bodyPr spcFirstLastPara="0" vert="horz" wrap="square" lIns="39370" tIns="39370" rIns="39370" bIns="39370" numCol="1" spcCol="1270" anchor="ctr" anchorCtr="0">
+          <a:noAutofit/>
+        </a:bodyPr>
+        <a:lstStyle/>
+        <a:p>
+          <a:pPr lvl="0" algn="ctr" defTabSz="1377950">
+            <a:lnSpc>
+              <a:spcPct val="90000"/>
+            </a:lnSpc>
+            <a:spcBef>
+              <a:spcPct val="0"/>
+            </a:spcBef>
+            <a:spcAft>
+              <a:spcPct val="35000"/>
+            </a:spcAft>
+          </a:pPr>
+          <a:r>
+            <a:rPr lang="pt-BR" sz="3100" kern="1200" dirty="0" smtClean="0">
+              <a:solidFill>
+                <a:srgbClr val="333333"/>
+              </a:solidFill>
+            </a:rPr>
+            <a:t>Prazer</a:t>
+          </a:r>
+          <a:endParaRPr lang="pt-BR" sz="3100" kern="1200" dirty="0">
+            <a:solidFill>
+              <a:srgbClr val="333333"/>
+            </a:solidFill>
+          </a:endParaRPr>
+        </a:p>
+      </dsp:txBody>
+      <dsp:txXfrm>
+        <a:off x="1520380" y="0"/>
+        <a:ext cx="1520380" cy="919658"/>
+      </dsp:txXfrm>
+    </dsp:sp>
+    <dsp:sp modelId="{7413B943-16B8-46C6-A933-64E7C7E2DA5D}">
+      <dsp:nvSpPr>
+        <dsp:cNvPr id="0" name=""/>
+        <dsp:cNvSpPr/>
+      </dsp:nvSpPr>
+      <dsp:spPr>
+        <a:xfrm>
+          <a:off x="760190" y="919658"/>
+          <a:ext cx="3040760" cy="919658"/>
+        </a:xfrm>
+        <a:prstGeom prst="trapezoid">
+          <a:avLst>
+            <a:gd name="adj" fmla="val 82660"/>
+          </a:avLst>
+        </a:prstGeom>
+        <a:solidFill>
+          <a:schemeClr val="accent6">
+            <a:alpha val="90000"/>
+            <a:hueOff val="0"/>
+            <a:satOff val="0"/>
+            <a:lumOff val="0"/>
+            <a:alphaOff val="-20000"/>
+          </a:schemeClr>
+        </a:solidFill>
+        <a:ln w="25400" cap="flat" cmpd="sng" algn="ctr">
+          <a:solidFill>
+            <a:schemeClr val="lt1">
+              <a:hueOff val="0"/>
+              <a:satOff val="0"/>
+              <a:lumOff val="0"/>
+              <a:alphaOff val="0"/>
+            </a:schemeClr>
+          </a:solidFill>
+          <a:prstDash val="solid"/>
+        </a:ln>
+        <a:effectLst/>
+      </dsp:spPr>
+      <dsp:style>
+        <a:lnRef idx="2">
+          <a:scrgbClr r="0" g="0" b="0"/>
+        </a:lnRef>
+        <a:fillRef idx="1">
+          <a:scrgbClr r="0" g="0" b="0"/>
+        </a:fillRef>
+        <a:effectRef idx="0">
+          <a:scrgbClr r="0" g="0" b="0"/>
+        </a:effectRef>
+        <a:fontRef idx="minor">
+          <a:schemeClr val="lt1"/>
+        </a:fontRef>
+      </dsp:style>
+      <dsp:txBody>
+        <a:bodyPr spcFirstLastPara="0" vert="horz" wrap="square" lIns="39370" tIns="39370" rIns="39370" bIns="39370" numCol="1" spcCol="1270" anchor="ctr" anchorCtr="0">
+          <a:noAutofit/>
+        </a:bodyPr>
+        <a:lstStyle/>
+        <a:p>
+          <a:pPr lvl="0" algn="ctr" defTabSz="1377950">
+            <a:lnSpc>
+              <a:spcPct val="90000"/>
+            </a:lnSpc>
+            <a:spcBef>
+              <a:spcPct val="0"/>
+            </a:spcBef>
+            <a:spcAft>
+              <a:spcPct val="35000"/>
+            </a:spcAft>
+          </a:pPr>
+          <a:r>
+            <a:rPr lang="pt-BR" sz="3100" kern="1200" dirty="0" smtClean="0">
+              <a:solidFill>
+                <a:srgbClr val="333333"/>
+              </a:solidFill>
+            </a:rPr>
+            <a:t>Usabilidade</a:t>
+          </a:r>
+          <a:endParaRPr lang="pt-BR" sz="3100" kern="1200" dirty="0">
+            <a:solidFill>
+              <a:srgbClr val="333333"/>
+            </a:solidFill>
+          </a:endParaRPr>
+        </a:p>
+      </dsp:txBody>
+      <dsp:txXfrm>
+        <a:off x="1292323" y="919658"/>
+        <a:ext cx="1976494" cy="919658"/>
+      </dsp:txXfrm>
+    </dsp:sp>
+    <dsp:sp modelId="{A8FC50AC-6C59-436F-92BA-75264190A3CE}">
+      <dsp:nvSpPr>
+        <dsp:cNvPr id="0" name=""/>
+        <dsp:cNvSpPr/>
+      </dsp:nvSpPr>
+      <dsp:spPr>
+        <a:xfrm>
+          <a:off x="0" y="1839316"/>
+          <a:ext cx="4561140" cy="919658"/>
+        </a:xfrm>
+        <a:prstGeom prst="trapezoid">
+          <a:avLst>
+            <a:gd name="adj" fmla="val 82660"/>
+          </a:avLst>
+        </a:prstGeom>
+        <a:solidFill>
+          <a:schemeClr val="accent6">
+            <a:alpha val="90000"/>
+            <a:hueOff val="0"/>
+            <a:satOff val="0"/>
+            <a:lumOff val="0"/>
+            <a:alphaOff val="-40000"/>
+          </a:schemeClr>
+        </a:solidFill>
+        <a:ln w="25400" cap="flat" cmpd="sng" algn="ctr">
+          <a:solidFill>
+            <a:schemeClr val="lt1">
+              <a:hueOff val="0"/>
+              <a:satOff val="0"/>
+              <a:lumOff val="0"/>
+              <a:alphaOff val="0"/>
+            </a:schemeClr>
+          </a:solidFill>
+          <a:prstDash val="solid"/>
+        </a:ln>
+        <a:effectLst/>
+      </dsp:spPr>
+      <dsp:style>
+        <a:lnRef idx="2">
+          <a:scrgbClr r="0" g="0" b="0"/>
+        </a:lnRef>
+        <a:fillRef idx="1">
+          <a:scrgbClr r="0" g="0" b="0"/>
+        </a:fillRef>
+        <a:effectRef idx="0">
+          <a:scrgbClr r="0" g="0" b="0"/>
+        </a:effectRef>
+        <a:fontRef idx="minor">
+          <a:schemeClr val="lt1"/>
+        </a:fontRef>
+      </dsp:style>
+      <dsp:txBody>
+        <a:bodyPr spcFirstLastPara="0" vert="horz" wrap="square" lIns="39370" tIns="39370" rIns="39370" bIns="39370" numCol="1" spcCol="1270" anchor="ctr" anchorCtr="0">
+          <a:noAutofit/>
+        </a:bodyPr>
+        <a:lstStyle/>
+        <a:p>
+          <a:pPr lvl="0" algn="ctr" defTabSz="1377950">
+            <a:lnSpc>
+              <a:spcPct val="90000"/>
+            </a:lnSpc>
+            <a:spcBef>
+              <a:spcPct val="0"/>
+            </a:spcBef>
+            <a:spcAft>
+              <a:spcPct val="35000"/>
+            </a:spcAft>
+          </a:pPr>
+          <a:r>
+            <a:rPr lang="pt-BR" sz="3100" kern="1200" dirty="0" smtClean="0">
+              <a:solidFill>
+                <a:srgbClr val="333333"/>
+              </a:solidFill>
+            </a:rPr>
+            <a:t>Funcionalidade</a:t>
+          </a:r>
+          <a:endParaRPr lang="pt-BR" sz="3100" kern="1200" dirty="0">
+            <a:solidFill>
+              <a:srgbClr val="333333"/>
+            </a:solidFill>
+          </a:endParaRPr>
+        </a:p>
+      </dsp:txBody>
+      <dsp:txXfrm>
+        <a:off x="798199" y="1839316"/>
+        <a:ext cx="2964741" cy="919658"/>
+      </dsp:txXfrm>
+    </dsp:sp>
+  </dsp:spTree>
+</dsp:drawing>
+</file>
+
+<file path=ppt/diagrams/layout1.xml><?xml version="1.0" encoding="utf-8"?>
+<dgm:layoutDef xmlns:dgm="http://schemas.openxmlformats.org/drawingml/2006/diagram" xmlns:a="http://schemas.openxmlformats.org/drawingml/2006/main" uniqueId="urn:microsoft.com/office/officeart/2005/8/layout/pyramid1">
+  <dgm:title val=""/>
+  <dgm:desc val=""/>
+  <dgm:catLst>
+    <dgm:cat type="pyramid" pri="1000"/>
+  </dgm:catLst>
+  <dgm:sampData useDef="1">
+    <dgm:dataModel>
+      <dgm:ptLst/>
+      <dgm:bg/>
+      <dgm:whole/>
+    </dgm:dataModel>
+  </dgm:sampData>
+  <dgm:styleData>
+    <dgm:dataModel>
+      <dgm:ptLst>
+        <dgm:pt modelId="0" type="doc"/>
+        <dgm:pt modelId="1"/>
+        <dgm:pt modelId="2"/>
+      </dgm:ptLst>
+      <dgm:cxnLst>
+        <dgm:cxn modelId="3" srcId="0" destId="1" srcOrd="0" destOrd="0"/>
+        <dgm:cxn modelId="4" srcId="0" destId="2" srcOrd="1" destOrd="0"/>
+      </dgm:cxnLst>
+      <dgm:bg/>
+      <dgm:whole/>
+    </dgm:dataModel>
+  </dgm:styleData>
+  <dgm:clrData>
+    <dgm:dataModel>
+      <dgm:ptLst>
+        <dgm:pt modelId="0" type="doc"/>
+        <dgm:pt modelId="1"/>
+        <dgm:pt modelId="2"/>
+        <dgm:pt modelId="3"/>
+        <dgm:pt modelId="4"/>
+      </dgm:ptLst>
+      <dgm:cxnLst>
+        <dgm:cxn modelId="5" srcId="0" destId="1" srcOrd="0" destOrd="0"/>
+        <dgm:cxn modelId="6" srcId="0" destId="2" srcOrd="1" destOrd="0"/>
+        <dgm:cxn modelId="7" srcId="0" destId="3" srcOrd="2" destOrd="0"/>
+        <dgm:cxn modelId="8" srcId="0" destId="4" srcOrd="3" destOrd="0"/>
+      </dgm:cxnLst>
+      <dgm:bg/>
+      <dgm:whole/>
+    </dgm:dataModel>
+  </dgm:clrData>
+  <dgm:layoutNode name="Name0">
+    <dgm:varLst>
+      <dgm:dir/>
+      <dgm:animLvl val="lvl"/>
+      <dgm:resizeHandles val="exact"/>
+    </dgm:varLst>
+    <dgm:choose name="Name1">
+      <dgm:if name="Name2" func="var" arg="dir" op="equ" val="norm">
+        <dgm:alg type="pyra">
+          <dgm:param type="linDir" val="fromB"/>
+          <dgm:param type="txDir" val="fromT"/>
+          <dgm:param type="pyraAcctPos" val="aft"/>
+          <dgm:param type="pyraAcctTxMar" val="step"/>
+          <dgm:param type="pyraAcctBkgdNode" val="acctBkgd"/>
+          <dgm:param type="pyraAcctTxNode" val="acctTx"/>
+          <dgm:param type="pyraLvlNode" val="level"/>
+        </dgm:alg>
+      </dgm:if>
+      <dgm:else name="Name3">
+        <dgm:alg type="pyra">
+          <dgm:param type="linDir" val="fromB"/>
+          <dgm:param type="txDir" val="fromT"/>
+          <dgm:param type="pyraAcctPos" val="bef"/>
+          <dgm:param type="pyraAcctTxMar" val="step"/>
+          <dgm:param type="pyraAcctBkgdNode" val="acctBkgd"/>
+          <dgm:param type="pyraAcctTxNode" val="acctTx"/>
+          <dgm:param type="pyraLvlNode" val="level"/>
+        </dgm:alg>
+      </dgm:else>
+    </dgm:choose>
+    <dgm:shape xmlns:r="http://schemas.openxmlformats.org/officeDocument/2006/relationships" r:blip="">
+      <dgm:adjLst/>
+    </dgm:shape>
+    <dgm:presOf/>
+    <dgm:choose name="Name4">
+      <dgm:if name="Name5" axis="root des" ptType="all node" func="maxDepth" op="gte" val="2">
+        <dgm:constrLst>
+          <dgm:constr type="primFontSz" for="des" forName="levelTx" op="equ"/>
+          <dgm:constr type="secFontSz" for="des" forName="acctTx" op="equ"/>
+          <dgm:constr type="pyraAcctRatio" val="0.32"/>
+        </dgm:constrLst>
+      </dgm:if>
+      <dgm:else name="Name6">
+        <dgm:constrLst>
+          <dgm:constr type="primFontSz" for="des" forName="levelTx" op="equ"/>
+          <dgm:constr type="secFontSz" for="des" forName="acctTx" op="equ"/>
+          <dgm:constr type="pyraAcctRatio"/>
+        </dgm:constrLst>
+      </dgm:else>
+    </dgm:choose>
+    <dgm:ruleLst/>
+    <dgm:forEach name="Name7" axis="ch" ptType="node">
+      <dgm:layoutNode name="Name8">
+        <dgm:alg type="composite">
+          <dgm:param type="horzAlign" val="none"/>
+        </dgm:alg>
+        <dgm:shape xmlns:r="http://schemas.openxmlformats.org/officeDocument/2006/relationships" r:blip="">
+          <dgm:adjLst/>
+        </dgm:shape>
+        <dgm:presOf/>
+        <dgm:choose name="Name9">
+          <dgm:if name="Name10" axis="self" ptType="node" func="pos" op="equ" val="1">
+            <dgm:constrLst>
+              <dgm:constr type="ctrX" for="ch" forName="acctBkgd" val="1"/>
+              <dgm:constr type="ctrY" for="ch" forName="acctBkgd" val="1"/>
+              <dgm:constr type="w" for="ch" forName="acctBkgd" val="1"/>
+              <dgm:constr type="h" for="ch" forName="acctBkgd" val="1"/>
+              <dgm:constr type="ctrX" for="ch" forName="acctTx" val="1"/>
+              <dgm:constr type="ctrY" for="ch" forName="acctTx" val="1"/>
+              <dgm:constr type="w" for="ch" forName="acctTx" val="1"/>
+              <dgm:constr type="h" for="ch" forName="acctTx" val="1"/>
+              <dgm:constr type="ctrX" for="ch" forName="level" val="1"/>
+              <dgm:constr type="ctrY" for="ch" forName="level" val="1"/>
+              <dgm:constr type="w" for="ch" forName="level" val="1"/>
+              <dgm:constr type="h" for="ch" forName="level" val="1"/>
+              <dgm:constr type="ctrX" for="ch" forName="levelTx" refType="ctrX" refFor="ch" refForName="level"/>
+              <dgm:constr type="ctrY" for="ch" forName="levelTx" refType="ctrY" refFor="ch" refForName="level"/>
+              <dgm:constr type="w" for="ch" forName="levelTx" refType="w" refFor="ch" refForName="level"/>
+              <dgm:constr type="h" for="ch" forName="levelTx" refType="h" refFor="ch" refForName="level"/>
+            </dgm:constrLst>
+          </dgm:if>
+          <dgm:else name="Name11">
+            <dgm:constrLst>
+              <dgm:constr type="ctrX" for="ch" forName="acctBkgd" val="1"/>
+              <dgm:constr type="ctrY" for="ch" forName="acctBkgd" val="1"/>
+              <dgm:constr type="w" for="ch" forName="acctBkgd" val="1"/>
+              <dgm:constr type="h" for="ch" forName="acctBkgd" val="1"/>
+              <dgm:constr type="ctrX" for="ch" forName="acctTx" val="1"/>
+              <dgm:constr type="ctrY" for="ch" forName="acctTx" val="1"/>
+              <dgm:constr type="w" for="ch" forName="acctTx" val="1"/>
+              <dgm:constr type="h" for="ch" forName="acctTx" val="1"/>
+              <dgm:constr type="ctrX" for="ch" forName="level" val="1"/>
+              <dgm:constr type="ctrY" for="ch" forName="level" val="1"/>
+              <dgm:constr type="w" for="ch" forName="level" val="1"/>
+              <dgm:constr type="h" for="ch" forName="level" val="1"/>
+              <dgm:constr type="ctrX" for="ch" forName="levelTx" refType="ctrX" refFor="ch" refForName="level"/>
+              <dgm:constr type="ctrY" for="ch" forName="levelTx" refType="ctrY" refFor="ch" refForName="level"/>
+              <dgm:constr type="w" for="ch" forName="levelTx" refType="w" refFor="ch" refForName="level" fact="0.65"/>
+              <dgm:constr type="h" for="ch" forName="levelTx" refType="h" refFor="ch" refForName="level"/>
+            </dgm:constrLst>
+          </dgm:else>
+        </dgm:choose>
+        <dgm:ruleLst/>
+        <dgm:choose name="Name12">
+          <dgm:if name="Name13" axis="ch" ptType="node" func="cnt" op="gte" val="1">
+            <dgm:layoutNode name="acctBkgd" styleLbl="alignAcc1">
+              <dgm:alg type="sp"/>
+              <dgm:shape xmlns:r="http://schemas.openxmlformats.org/officeDocument/2006/relationships" type="nonIsoscelesTrapezoid" r:blip="">
+                <dgm:adjLst/>
+              </dgm:shape>
+              <dgm:presOf axis="des" ptType="node"/>
+              <dgm:constrLst/>
+              <dgm:ruleLst/>
+            </dgm:layoutNode>
+            <dgm:layoutNode name="acctTx" styleLbl="alignAcc1">
+              <dgm:varLst>
+                <dgm:bulletEnabled val="1"/>
+              </dgm:varLst>
+              <dgm:alg type="tx">
+                <dgm:param type="stBulletLvl" val="1"/>
+                <dgm:param type="txAnchorVertCh" val="mid"/>
+              </dgm:alg>
+              <dgm:shape xmlns:r="http://schemas.openxmlformats.org/officeDocument/2006/relationships" type="nonIsoscelesTrapezoid" r:blip="" hideGeom="1">
+                <dgm:adjLst/>
+              </dgm:shape>
+              <dgm:presOf axis="des" ptType="node"/>
+              <dgm:constrLst>
+                <dgm:constr type="secFontSz" val="65"/>
+                <dgm:constr type="primFontSz" refType="secFontSz"/>
+                <dgm:constr type="tMarg" refType="secFontSz" fact="0.3"/>
+                <dgm:constr type="bMarg" refType="secFontSz" fact="0.3"/>
+                <dgm:constr type="lMarg" refType="secFontSz" fact="0.3"/>
+                <dgm:constr type="rMarg" refType="secFontSz" fact="0.3"/>
+              </dgm:constrLst>
+              <dgm:ruleLst>
+                <dgm:rule type="secFontSz" val="5" fact="NaN" max="NaN"/>
+              </dgm:ruleLst>
+            </dgm:layoutNode>
+          </dgm:if>
+          <dgm:else name="Name14"/>
+        </dgm:choose>
+        <dgm:layoutNode name="level">
+          <dgm:varLst>
+            <dgm:chMax val="1"/>
+            <dgm:bulletEnabled val="1"/>
+          </dgm:varLst>
+          <dgm:alg type="sp"/>
+          <dgm:shape xmlns:r="http://schemas.openxmlformats.org/officeDocument/2006/relationships" type="trapezoid" r:blip="">
+            <dgm:adjLst/>
+          </dgm:shape>
+          <dgm:presOf axis="self"/>
+          <dgm:constrLst>
+            <dgm:constr type="h" val="500"/>
+            <dgm:constr type="w" val="1"/>
+          </dgm:constrLst>
+          <dgm:ruleLst/>
+        </dgm:layoutNode>
+        <dgm:layoutNode name="levelTx" styleLbl="revTx">
+          <dgm:varLst>
+            <dgm:chMax val="1"/>
+            <dgm:bulletEnabled val="1"/>
+          </dgm:varLst>
+          <dgm:alg type="tx"/>
+          <dgm:shape xmlns:r="http://schemas.openxmlformats.org/officeDocument/2006/relationships" type="rect" r:blip="" hideGeom="1">
+            <dgm:adjLst/>
+          </dgm:shape>
+          <dgm:presOf axis="self"/>
+          <dgm:constrLst>
+            <dgm:constr type="tMarg" refType="primFontSz" fact="0.1"/>
+            <dgm:constr type="bMarg" refType="primFontSz" fact="0.1"/>
+            <dgm:constr type="lMarg" refType="primFontSz" fact="0.1"/>
+            <dgm:constr type="rMarg" refType="primFontSz" fact="0.1"/>
+            <dgm:constr type="primFontSz" val="65"/>
+          </dgm:constrLst>
+          <dgm:ruleLst>
+            <dgm:rule type="primFontSz" val="5" fact="NaN" max="NaN"/>
+          </dgm:ruleLst>
+        </dgm:layoutNode>
+      </dgm:layoutNode>
+    </dgm:forEach>
+  </dgm:layoutNode>
+</dgm:layoutDef>
+</file>
+
+<file path=ppt/diagrams/quickStyle1.xml><?xml version="1.0" encoding="utf-8"?>
+<dgm:styleDef xmlns:dgm="http://schemas.openxmlformats.org/drawingml/2006/diagram" xmlns:a="http://schemas.openxmlformats.org/drawingml/2006/main" uniqueId="urn:microsoft.com/office/officeart/2005/8/quickstyle/simple1">
+  <dgm:title val=""/>
+  <dgm:desc val=""/>
+  <dgm:catLst>
+    <dgm:cat type="simple" pri="10100"/>
+  </dgm:catLst>
+  <dgm:scene3d>
+    <a:camera prst="orthographicFront"/>
+    <a:lightRig rig="threePt" dir="t"/>
+  </dgm:scene3d>
+  <dgm:styleLbl name="node0">
+    <dgm:scene3d>
+      <a:camera prst="orthographicFront"/>
+      <a:lightRig rig="threePt" dir="t"/>
+    </dgm:scene3d>
+    <dgm:sp3d/>
+    <dgm:txPr/>
+    <dgm:style>
+      <a:lnRef idx="2">
+        <a:scrgbClr r="0" g="0" b="0"/>
+      </a:lnRef>
+      <a:fillRef idx="1">
+        <a:scrgbClr r="0" g="0" b="0"/>
+      </a:fillRef>
+      <a:effectRef idx="0">
+        <a:scrgbClr r="0" g="0" b="0"/>
+      </a:effectRef>
+      <a:fontRef idx="minor">
+        <a:schemeClr val="lt1"/>
+      </a:fontRef>
+    </dgm:style>
+  </dgm:styleLbl>
+  <dgm:styleLbl name="lnNode1">
+    <dgm:scene3d>
+      <a:camera prst="orthographicFront"/>
+      <a:lightRig rig="threePt" dir="t"/>
+    </dgm:scene3d>
+    <dgm:sp3d/>
+    <dgm:txPr/>
+    <dgm:style>
+      <a:lnRef idx="2">
+        <a:scrgbClr r="0" g="0" b="0"/>
+      </a:lnRef>
+      <a:fillRef idx="1">
+        <a:scrgbClr r="0" g="0" b="0"/>
+      </a:fillRef>
+      <a:effectRef idx="0">
+        <a:scrgbClr r="0" g="0" b="0"/>
+      </a:effectRef>
+      <a:fontRef idx="minor">
+        <a:schemeClr val="lt1"/>
+      </a:fontRef>
+    </dgm:style>
+  </dgm:styleLbl>
+  <dgm:styleLbl name="vennNode1">
+    <dgm:scene3d>
+      <a:camera prst="orthographicFront"/>
+      <a:lightRig rig="threePt" dir="t"/>
+    </dgm:scene3d>
+    <dgm:sp3d/>
+    <dgm:txPr/>
+    <dgm:style>
+      <a:lnRef idx="2">
+        <a:scrgbClr r="0" g="0" b="0"/>
+      </a:lnRef>
+      <a:fillRef idx="1">
+        <a:scrgbClr r="0" g="0" b="0"/>
+      </a:fillRef>
+      <a:effectRef idx="0">
+        <a:scrgbClr r="0" g="0" b="0"/>
+      </a:effectRef>
+      <a:fontRef idx="minor">
+        <a:schemeClr val="tx1"/>
+      </a:fontRef>
+    </dgm:style>
+  </dgm:styleLbl>
+  <dgm:styleLbl name="alignNode1">
+    <dgm:scene3d>
+      <a:camera prst="orthographicFront"/>
+      <a:lightRig rig="threePt" dir="t"/>
+    </dgm:scene3d>
+    <dgm:sp3d/>
+    <dgm:txPr/>
+    <dgm:style>
+      <a:lnRef idx="2">
+        <a:scrgbClr r="0" g="0" b="0"/>
+      </a:lnRef>
+      <a:fillRef idx="1">
+        <a:scrgbClr r="0" g="0" b="0"/>
+      </a:fillRef>
+      <a:effectRef idx="0">
+        <a:scrgbClr r="0" g="0" b="0"/>
+      </a:effectRef>
+      <a:fontRef idx="minor">
+        <a:schemeClr val="lt1"/>
+      </a:fontRef>
+    </dgm:style>
+  </dgm:styleLbl>
+  <dgm:styleLbl name="node1">
+    <dgm:scene3d>
+      <a:camera prst="orthographicFront"/>
+      <a:lightRig rig="threePt" dir="t"/>
+    </dgm:scene3d>
+    <dgm:sp3d/>
+    <dgm:txPr/>
+    <dgm:style>
+      <a:lnRef idx="2">
+        <a:scrgbClr r="0" g="0" b="0"/>
+      </a:lnRef>
+      <a:fillRef idx="1">
+        <a:scrgbClr r="0" g="0" b="0"/>
+      </a:fillRef>
+      <a:effectRef idx="0">
+        <a:scrgbClr r="0" g="0" b="0"/>
+      </a:effectRef>
+      <a:fontRef idx="minor">
+        <a:schemeClr val="lt1"/>
+      </a:fontRef>
+    </dgm:style>
+  </dgm:styleLbl>
+  <dgm:styleLbl name="node2">
+    <dgm:scene3d>
+      <a:camera prst="orthographicFront"/>
+      <a:lightRig rig="threePt" dir="t"/>
+    </dgm:scene3d>
+    <dgm:sp3d/>
+    <dgm:txPr/>
+    <dgm:style>
+      <a:lnRef idx="2">
+        <a:scrgbClr r="0" g="0" b="0"/>
+      </a:lnRef>
+      <a:fillRef idx="1">
+        <a:scrgbClr r="0" g="0" b="0"/>
+      </a:fillRef>
+      <a:effectRef idx="0">
+        <a:scrgbClr r="0" g="0" b="0"/>
+      </a:effectRef>
+      <a:fontRef idx="minor">
+        <a:schemeClr val="lt1"/>
+      </a:fontRef>
+    </dgm:style>
+  </dgm:styleLbl>
+  <dgm:styleLbl name="node3">
+    <dgm:scene3d>
+      <a:camera prst="orthographicFront"/>
+      <a:lightRig rig="threePt" dir="t"/>
+    </dgm:scene3d>
+    <dgm:sp3d/>
+    <dgm:txPr/>
+    <dgm:style>
+      <a:lnRef idx="2">
+        <a:scrgbClr r="0" g="0" b="0"/>
+      </a:lnRef>
+      <a:fillRef idx="1">
+        <a:scrgbClr r="0" g="0" b="0"/>
+      </a:fillRef>
+      <a:effectRef idx="0">
+        <a:scrgbClr r="0" g="0" b="0"/>
+      </a:effectRef>
+      <a:fontRef idx="minor">
+        <a:schemeClr val="lt1"/>
+      </a:fontRef>
+    </dgm:style>
+  </dgm:styleLbl>
+  <dgm:styleLbl name="node4">
+    <dgm:scene3d>
+      <a:camera prst="orthographicFront"/>
+      <a:lightRig rig="threePt" dir="t"/>
+    </dgm:scene3d>
+    <dgm:sp3d/>
+    <dgm:txPr/>
+    <dgm:style>
+      <a:lnRef idx="2">
+        <a:scrgbClr r="0" g="0" b="0"/>
+      </a:lnRef>
+      <a:fillRef idx="1">
+        <a:scrgbClr r="0" g="0" b="0"/>
+      </a:fillRef>
+      <a:effectRef idx="0">
+        <a:scrgbClr r="0" g="0" b="0"/>
+      </a:effectRef>
+      <a:fontRef idx="minor">
+        <a:schemeClr val="lt1"/>
+      </a:fontRef>
+    </dgm:style>
+  </dgm:styleLbl>
+  <dgm:styleLbl name="fgImgPlace1">
+    <dgm:scene3d>
+      <a:camera prst="orthographicFront"/>
+      <a:lightRig rig="threePt" dir="t"/>
+    </dgm:scene3d>
+    <dgm:sp3d/>
+    <dgm:txPr/>
+    <dgm:style>
+      <a:lnRef idx="2">
+        <a:scrgbClr r="0" g="0" b="0"/>
+      </a:lnRef>
+      <a:fillRef idx="1">
+        <a:scrgbClr r="0" g="0" b="0"/>
+      </a:fillRef>
+      <a:effectRef idx="0">
+        <a:scrgbClr r="0" g="0" b="0"/>
+      </a:effectRef>
+      <a:fontRef idx="minor"/>
+    </dgm:style>
+  </dgm:styleLbl>
+  <dgm:styleLbl name="alignImgPlace1">
+    <dgm:scene3d>
+      <a:camera prst="orthographicFront"/>
+      <a:lightRig rig="threePt" dir="t"/>
+    </dgm:scene3d>
+    <dgm:sp3d/>
+    <dgm:txPr/>
+    <dgm:style>
+      <a:lnRef idx="2">
+        <a:scrgbClr r="0" g="0" b="0"/>
+      </a:lnRef>
+      <a:fillRef idx="1">
+        <a:scrgbClr r="0" g="0" b="0"/>
+      </a:fillRef>
+      <a:effectRef idx="0">
+        <a:scrgbClr r="0" g="0" b="0"/>
+      </a:effectRef>
+      <a:fontRef idx="minor"/>
+    </dgm:style>
+  </dgm:styleLbl>
+  <dgm:styleLbl name="bgImgPlace1">
+    <dgm:scene3d>
+      <a:camera prst="orthographicFront"/>
+      <a:lightRig rig="threePt" dir="t"/>
+    </dgm:scene3d>
+    <dgm:sp3d/>
+    <dgm:txPr/>
+    <dgm:style>
+      <a:lnRef idx="2">
+        <a:scrgbClr r="0" g="0" b="0"/>
+      </a:lnRef>
+      <a:fillRef idx="1">
+        <a:scrgbClr r="0" g="0" b="0"/>
+      </a:fillRef>
+      <a:effectRef idx="0">
+        <a:scrgbClr r="0" g="0" b="0"/>
+      </a:effectRef>
+      <a:fontRef idx="minor"/>
+    </dgm:style>
+  </dgm:styleLbl>
+  <dgm:styleLbl name="sibTrans2D1">
+    <dgm:scene3d>
+      <a:camera prst="orthographicFront"/>
+      <a:lightRig rig="threePt" dir="t"/>
+    </dgm:scene3d>
+    <dgm:sp3d/>
+    <dgm:txPr/>
+    <dgm:style>
+      <a:lnRef idx="0">
+        <a:scrgbClr r="0" g="0" b="0"/>
+      </a:lnRef>
+      <a:fillRef idx="1">
+        <a:scrgbClr r="0" g="0" b="0"/>
+      </a:fillRef>
+      <a:effectRef idx="0">
+        <a:scrgbClr r="0" g="0" b="0"/>
+      </a:effectRef>
+      <a:fontRef idx="minor">
+        <a:schemeClr val="lt1"/>
+      </a:fontRef>
+    </dgm:style>
+  </dgm:styleLbl>
+  <dgm:styleLbl name="fgSibTrans2D1">
+    <dgm:scene3d>
+      <a:camera prst="orthographicFront"/>
+      <a:lightRig rig="threePt" dir="t"/>
+    </dgm:scene3d>
+    <dgm:sp3d/>
+    <dgm:txPr/>
+    <dgm:style>
+      <a:lnRef idx="0">
+        <a:scrgbClr r="0" g="0" b="0"/>
+      </a:lnRef>
+      <a:fillRef idx="1">
+        <a:scrgbClr r="0" g="0" b="0"/>
+      </a:fillRef>
+      <a:effectRef idx="0">
+        <a:scrgbClr r="0" g="0" b="0"/>
+      </a:effectRef>
+      <a:fontRef idx="minor">
+        <a:schemeClr val="lt1"/>
+      </a:fontRef>
+    </dgm:style>
+  </dgm:styleLbl>
+  <dgm:styleLbl name="bgSibTrans2D1">
+    <dgm:scene3d>
+      <a:camera prst="orthographicFront"/>
+      <a:lightRig rig="threePt" dir="t"/>
+    </dgm:scene3d>
+    <dgm:sp3d/>
+    <dgm:txPr/>
+    <dgm:style>
+      <a:lnRef idx="0">
+        <a:scrgbClr r="0" g="0" b="0"/>
+      </a:lnRef>
+      <a:fillRef idx="1">
+        <a:scrgbClr r="0" g="0" b="0"/>
+      </a:fillRef>
+      <a:effectRef idx="0">
+        <a:scrgbClr r="0" g="0" b="0"/>
+      </a:effectRef>
+      <a:fontRef idx="minor">
+        <a:schemeClr val="lt1"/>
+      </a:fontRef>
+    </dgm:style>
+  </dgm:styleLbl>
+  <dgm:styleLbl name="sibTrans1D1">
+    <dgm:scene3d>
+      <a:camera prst="orthographicFront"/>
+      <a:lightRig rig="threePt" dir="t"/>
+    </dgm:scene3d>
+    <dgm:sp3d/>
+    <dgm:txPr/>
+    <dgm:style>
+      <a:lnRef idx="1">
+        <a:scrgbClr r="0" g="0" b="0"/>
+      </a:lnRef>
+      <a:fillRef idx="0">
+        <a:scrgbClr r="0" g="0" b="0"/>
+      </a:fillRef>
+      <a:effectRef idx="0">
+        <a:scrgbClr r="0" g="0" b="0"/>
+      </a:effectRef>
+      <a:fontRef idx="minor"/>
+    </dgm:style>
+  </dgm:styleLbl>
+  <dgm:styleLbl name="callout">
+    <dgm:scene3d>
+      <a:camera prst="orthographicFront"/>
+      <a:lightRig rig="threePt" dir="t"/>
+    </dgm:scene3d>
+    <dgm:sp3d/>
+    <dgm:txPr/>
+    <dgm:style>
+      <a:lnRef idx="2">
+        <a:scrgbClr r="0" g="0" b="0"/>
+      </a:lnRef>
+      <a:fillRef idx="1">
+        <a:scrgbClr r="0" g="0" b="0"/>
+      </a:fillRef>
+      <a:effectRef idx="0">
+        <a:scrgbClr r="0" g="0" b="0"/>
+      </a:effectRef>
+      <a:fontRef idx="minor"/>
+    </dgm:style>
+  </dgm:styleLbl>
+  <dgm:styleLbl name="asst0">
+    <dgm:scene3d>
+      <a:camera prst="orthographicFront"/>
+      <a:lightRig rig="threePt" dir="t"/>
+    </dgm:scene3d>
+    <dgm:sp3d/>
+    <dgm:txPr/>
+    <dgm:style>
+      <a:lnRef idx="2">
+        <a:scrgbClr r="0" g="0" b="0"/>
+      </a:lnRef>
+      <a:fillRef idx="1">
+        <a:scrgbClr r="0" g="0" b="0"/>
+      </a:fillRef>
+      <a:effectRef idx="0">
+        <a:scrgbClr r="0" g="0" b="0"/>
+      </a:effectRef>
+      <a:fontRef idx="minor">
+        <a:schemeClr val="lt1"/>
+      </a:fontRef>
+    </dgm:style>
+  </dgm:styleLbl>
+  <dgm:styleLbl name="asst1">
+    <dgm:scene3d>
+      <a:camera prst="orthographicFront"/>
+      <a:lightRig rig="threePt" dir="t"/>
+    </dgm:scene3d>
+    <dgm:sp3d/>
+    <dgm:txPr/>
+    <dgm:style>
+      <a:lnRef idx="2">
+        <a:scrgbClr r="0" g="0" b="0"/>
+      </a:lnRef>
+      <a:fillRef idx="1">
+        <a:scrgbClr r="0" g="0" b="0"/>
+      </a:fillRef>
+      <a:effectRef idx="0">
+        <a:scrgbClr r="0" g="0" b="0"/>
+      </a:effectRef>
+      <a:fontRef idx="minor">
+        <a:schemeClr val="lt1"/>
+      </a:fontRef>
+    </dgm:style>
+  </dgm:styleLbl>
+  <dgm:styleLbl name="asst2">
+    <dgm:scene3d>
+      <a:camera prst="orthographicFront"/>
+      <a:lightRig rig="threePt" dir="t"/>
+    </dgm:scene3d>
+    <dgm:sp3d/>
+    <dgm:txPr/>
+    <dgm:style>
+      <a:lnRef idx="2">
+        <a:scrgbClr r="0" g="0" b="0"/>
+      </a:lnRef>
+      <a:fillRef idx="1">
+        <a:scrgbClr r="0" g="0" b="0"/>
+      </a:fillRef>
+      <a:effectRef idx="0">
+        <a:scrgbClr r="0" g="0" b="0"/>
+      </a:effectRef>
+      <a:fontRef idx="minor">
+        <a:schemeClr val="lt1"/>
+      </a:fontRef>
+    </dgm:style>
+  </dgm:styleLbl>
+  <dgm:styleLbl name="asst3">
+    <dgm:scene3d>
+      <a:camera prst="orthographicFront"/>
+      <a:lightRig rig="threePt" dir="t"/>
+    </dgm:scene3d>
+    <dgm:sp3d/>
+    <dgm:txPr/>
+    <dgm:style>
+      <a:lnRef idx="2">
+        <a:scrgbClr r="0" g="0" b="0"/>
+      </a:lnRef>
+      <a:fillRef idx="1">
+        <a:scrgbClr r="0" g="0" b="0"/>
+      </a:fillRef>
+      <a:effectRef idx="0">
+        <a:scrgbClr r="0" g="0" b="0"/>
+      </a:effectRef>
+      <a:fontRef idx="minor">
+        <a:schemeClr val="lt1"/>
+      </a:fontRef>
+    </dgm:style>
+  </dgm:styleLbl>
+  <dgm:styleLbl name="asst4">
+    <dgm:scene3d>
+      <a:camera prst="orthographicFront"/>
+      <a:lightRig rig="threePt" dir="t"/>
+    </dgm:scene3d>
+    <dgm:sp3d/>
+    <dgm:txPr/>
+    <dgm:style>
+      <a:lnRef idx="2">
+        <a:scrgbClr r="0" g="0" b="0"/>
+      </a:lnRef>
+      <a:fillRef idx="1">
+        <a:scrgbClr r="0" g="0" b="0"/>
+      </a:fillRef>
+      <a:effectRef idx="0">
+        <a:scrgbClr r="0" g="0" b="0"/>
+      </a:effectRef>
+      <a:fontRef idx="minor">
+        <a:schemeClr val="lt1"/>
+      </a:fontRef>
+    </dgm:style>
+  </dgm:styleLbl>
+  <dgm:styleLbl name="parChTrans2D1">
+    <dgm:scene3d>
+      <a:camera prst="orthographicFront"/>
+      <a:lightRig rig="threePt" dir="t"/>
+    </dgm:scene3d>
+    <dgm:sp3d/>
+    <dgm:txPr/>
+    <dgm:style>
+      <a:lnRef idx="2">
+        <a:scrgbClr r="0" g="0" b="0"/>
+      </a:lnRef>
+      <a:fillRef idx="1">
+        <a:scrgbClr r="0" g="0" b="0"/>
+      </a:fillRef>
+      <a:effectRef idx="0">
+        <a:scrgbClr r="0" g="0" b="0"/>
+      </a:effectRef>
+      <a:fontRef idx="minor">
+        <a:schemeClr val="lt1"/>
+      </a:fontRef>
+    </dgm:style>
+  </dgm:styleLbl>
+  <dgm:styleLbl name="parChTrans2D2">
+    <dgm:scene3d>
+      <a:camera prst="orthographicFront"/>
+      <a:lightRig rig="threePt" dir="t"/>
+    </dgm:scene3d>
+    <dgm:sp3d/>
+    <dgm:txPr/>
+    <dgm:style>
+      <a:lnRef idx="2">
+        <a:scrgbClr r="0" g="0" b="0"/>
+      </a:lnRef>
+      <a:fillRef idx="1">
+        <a:scrgbClr r="0" g="0" b="0"/>
+      </a:fillRef>
+      <a:effectRef idx="0">
+        <a:scrgbClr r="0" g="0" b="0"/>
+      </a:effectRef>
+      <a:fontRef idx="minor">
+        <a:schemeClr val="lt1"/>
+      </a:fontRef>
+    </dgm:style>
+  </dgm:styleLbl>
+  <dgm:styleLbl name="parChTrans2D3">
+    <dgm:scene3d>
+      <a:camera prst="orthographicFront"/>
+      <a:lightRig rig="threePt" dir="t"/>
+    </dgm:scene3d>
+    <dgm:sp3d/>
+    <dgm:txPr/>
+    <dgm:style>
+      <a:lnRef idx="2">
+        <a:scrgbClr r="0" g="0" b="0"/>
+      </a:lnRef>
+      <a:fillRef idx="1">
+        <a:scrgbClr r="0" g="0" b="0"/>
+      </a:fillRef>
+      <a:effectRef idx="0">
+        <a:scrgbClr r="0" g="0" b="0"/>
+      </a:effectRef>
+      <a:fontRef idx="minor">
+        <a:schemeClr val="lt1"/>
+      </a:fontRef>
+    </dgm:style>
+  </dgm:styleLbl>
+  <dgm:styleLbl name="parChTrans2D4">
+    <dgm:scene3d>
+      <a:camera prst="orthographicFront"/>
+      <a:lightRig rig="threePt" dir="t"/>
+    </dgm:scene3d>
+    <dgm:sp3d/>
+    <dgm:txPr/>
+    <dgm:style>
+      <a:lnRef idx="2">
+        <a:scrgbClr r="0" g="0" b="0"/>
+      </a:lnRef>
+      <a:fillRef idx="1">
+        <a:scrgbClr r="0" g="0" b="0"/>
+      </a:fillRef>
+      <a:effectRef idx="0">
+        <a:scrgbClr r="0" g="0" b="0"/>
+      </a:effectRef>
+      <a:fontRef idx="minor">
+        <a:schemeClr val="lt1"/>
+      </a:fontRef>
+    </dgm:style>
+  </dgm:styleLbl>
+  <dgm:styleLbl name="parChTrans1D1">
+    <dgm:scene3d>
+      <a:camera prst="orthographicFront"/>
+      <a:lightRig rig="threePt" dir="t"/>
+    </dgm:scene3d>
+    <dgm:sp3d/>
+    <dgm:txPr/>
+    <dgm:style>
+      <a:lnRef idx="2">
+        <a:scrgbClr r="0" g="0" b="0"/>
+      </a:lnRef>
+      <a:fillRef idx="0">
+        <a:scrgbClr r="0" g="0" b="0"/>
+      </a:fillRef>
+      <a:effectRef idx="0">
+        <a:scrgbClr r="0" g="0" b="0"/>
+      </a:effectRef>
+      <a:fontRef idx="minor"/>
+    </dgm:style>
+  </dgm:styleLbl>
+  <dgm:styleLbl name="parChTrans1D2">
+    <dgm:scene3d>
+      <a:camera prst="orthographicFront"/>
+      <a:lightRig rig="threePt" dir="t"/>
+    </dgm:scene3d>
+    <dgm:sp3d/>
+    <dgm:txPr/>
+    <dgm:style>
+      <a:lnRef idx="2">
+        <a:scrgbClr r="0" g="0" b="0"/>
+      </a:lnRef>
+      <a:fillRef idx="0">
+        <a:scrgbClr r="0" g="0" b="0"/>
+      </a:fillRef>
+      <a:effectRef idx="0">
+        <a:scrgbClr r="0" g="0" b="0"/>
+      </a:effectRef>
+      <a:fontRef idx="minor"/>
+    </dgm:style>
+  </dgm:styleLbl>
+  <dgm:styleLbl name="parChTrans1D3">
+    <dgm:scene3d>
+      <a:camera prst="orthographicFront"/>
+      <a:lightRig rig="threePt" dir="t"/>
+    </dgm:scene3d>
+    <dgm:sp3d/>
+    <dgm:txPr/>
+    <dgm:style>
+      <a:lnRef idx="2">
+        <a:scrgbClr r="0" g="0" b="0"/>
+      </a:lnRef>
+      <a:fillRef idx="0">
+        <a:scrgbClr r="0" g="0" b="0"/>
+      </a:fillRef>
+      <a:effectRef idx="0">
+        <a:scrgbClr r="0" g="0" b="0"/>
+      </a:effectRef>
+      <a:fontRef idx="minor"/>
+    </dgm:style>
+  </dgm:styleLbl>
+  <dgm:styleLbl name="parChTrans1D4">
+    <dgm:scene3d>
+      <a:camera prst="orthographicFront"/>
+      <a:lightRig rig="threePt" dir="t"/>
+    </dgm:scene3d>
+    <dgm:sp3d/>
+    <dgm:txPr/>
+    <dgm:style>
+      <a:lnRef idx="2">
+        <a:scrgbClr r="0" g="0" b="0"/>
+      </a:lnRef>
+      <a:fillRef idx="0">
+        <a:scrgbClr r="0" g="0" b="0"/>
+      </a:fillRef>
+      <a:effectRef idx="0">
+        <a:scrgbClr r="0" g="0" b="0"/>
+      </a:effectRef>
+      <a:fontRef idx="minor"/>
+    </dgm:style>
+  </dgm:styleLbl>
+  <dgm:styleLbl name="fgAcc1">
+    <dgm:scene3d>
+      <a:camera prst="orthographicFront"/>
+      <a:lightRig rig="threePt" dir="t"/>
+    </dgm:scene3d>
+    <dgm:sp3d/>
+    <dgm:txPr/>
+    <dgm:style>
+      <a:lnRef idx="2">
+        <a:scrgbClr r="0" g="0" b="0"/>
+      </a:lnRef>
+      <a:fillRef idx="1">
+        <a:scrgbClr r="0" g="0" b="0"/>
+      </a:fillRef>
+      <a:effectRef idx="0">
+        <a:scrgbClr r="0" g="0" b="0"/>
+      </a:effectRef>
+      <a:fontRef idx="minor"/>
+    </dgm:style>
+  </dgm:styleLbl>
+  <dgm:styleLbl name="conFgAcc1">
+    <dgm:scene3d>
+      <a:camera prst="orthographicFront"/>
+      <a:lightRig rig="threePt" dir="t"/>
+    </dgm:scene3d>
+    <dgm:sp3d/>
+    <dgm:txPr/>
+    <dgm:style>
+      <a:lnRef idx="2">
+        <a:scrgbClr r="0" g="0" b="0"/>
+      </a:lnRef>
+      <a:fillRef idx="1">
+        <a:scrgbClr r="0" g="0" b="0"/>
+      </a:fillRef>
+      <a:effectRef idx="0">
+        <a:scrgbClr r="0" g="0" b="0"/>
+      </a:effectRef>
+      <a:fontRef idx="minor"/>
+    </dgm:style>
+  </dgm:styleLbl>
+  <dgm:styleLbl name="alignAcc1">
+    <dgm:scene3d>
+      <a:camera prst="orthographicFront"/>
+      <a:lightRig rig="threePt" dir="t"/>
+    </dgm:scene3d>
+    <dgm:sp3d/>
+    <dgm:txPr/>
+    <dgm:style>
+      <a:lnRef idx="2">
+        <a:scrgbClr r="0" g="0" b="0"/>
+      </a:lnRef>
+      <a:fillRef idx="1">
+        <a:scrgbClr r="0" g="0" b="0"/>
+      </a:fillRef>
+      <a:effectRef idx="0">
+        <a:scrgbClr r="0" g="0" b="0"/>
+      </a:effectRef>
+      <a:fontRef idx="minor"/>
+    </dgm:style>
+  </dgm:styleLbl>
+  <dgm:styleLbl name="trAlignAcc1">
+    <dgm:scene3d>
+      <a:camera prst="orthographicFront"/>
+      <a:lightRig rig="threePt" dir="t"/>
+    </dgm:scene3d>
+    <dgm:sp3d/>
+    <dgm:txPr/>
+    <dgm:style>
+      <a:lnRef idx="1">
+        <a:scrgbClr r="0" g="0" b="0"/>
+      </a:lnRef>
+      <a:fillRef idx="1">
+        <a:scrgbClr r="0" g="0" b="0"/>
+      </a:fillRef>
+      <a:effectRef idx="0">
+        <a:scrgbClr r="0" g="0" b="0"/>
+      </a:effectRef>
+      <a:fontRef idx="minor"/>
+    </dgm:style>
+  </dgm:styleLbl>
+  <dgm:styleLbl name="bgAcc1">
+    <dgm:scene3d>
+      <a:camera prst="orthographicFront"/>
+      <a:lightRig rig="threePt" dir="t"/>
+    </dgm:scene3d>
+    <dgm:sp3d/>
+    <dgm:txPr/>
+    <dgm:style>
+      <a:lnRef idx="2">
+        <a:scrgbClr r="0" g="0" b="0"/>
+      </a:lnRef>
+      <a:fillRef idx="1">
+        <a:scrgbClr r="0" g="0" b="0"/>
+      </a:fillRef>
+      <a:effectRef idx="0">
+        <a:scrgbClr r="0" g="0" b="0"/>
+      </a:effectRef>
+      <a:fontRef idx="minor"/>
+    </dgm:style>
+  </dgm:styleLbl>
+  <dgm:styleLbl name="solidFgAcc1">
+    <dgm:scene3d>
+      <a:camera prst="orthographicFront"/>
+      <a:lightRig rig="threePt" dir="t"/>
+    </dgm:scene3d>
+    <dgm:sp3d/>
+    <dgm:txPr/>
+    <dgm:style>
+      <a:lnRef idx="2">
+        <a:scrgbClr r="0" g="0" b="0"/>
+      </a:lnRef>
+      <a:fillRef idx="1">
+        <a:scrgbClr r="0" g="0" b="0"/>
+      </a:fillRef>
+      <a:effectRef idx="0">
+        <a:scrgbClr r="0" g="0" b="0"/>
+      </a:effectRef>
+      <a:fontRef idx="minor"/>
+    </dgm:style>
+  </dgm:styleLbl>
+  <dgm:styleLbl name="solidAlignAcc1">
+    <dgm:scene3d>
+      <a:camera prst="orthographicFront"/>
+      <a:lightRig rig="threePt" dir="t"/>
+    </dgm:scene3d>
+    <dgm:sp3d/>
+    <dgm:txPr/>
+    <dgm:style>
+      <a:lnRef idx="2">
+        <a:scrgbClr r="0" g="0" b="0"/>
+      </a:lnRef>
+      <a:fillRef idx="1">
+        <a:scrgbClr r="0" g="0" b="0"/>
+      </a:fillRef>
+      <a:effectRef idx="0">
+        <a:scrgbClr r="0" g="0" b="0"/>
+      </a:effectRef>
+      <a:fontRef idx="minor"/>
+    </dgm:style>
+  </dgm:styleLbl>
+  <dgm:styleLbl name="solidBgAcc1">
+    <dgm:scene3d>
+      <a:camera prst="orthographicFront"/>
+      <a:lightRig rig="threePt" dir="t"/>
+    </dgm:scene3d>
+    <dgm:sp3d/>
+    <dgm:txPr/>
+    <dgm:style>
+      <a:lnRef idx="2">
+        <a:scrgbClr r="0" g="0" b="0"/>
+      </a:lnRef>
+      <a:fillRef idx="1">
+        <a:scrgbClr r="0" g="0" b="0"/>
+      </a:fillRef>
+      <a:effectRef idx="0">
+        <a:scrgbClr r="0" g="0" b="0"/>
+      </a:effectRef>
+      <a:fontRef idx="minor"/>
+    </dgm:style>
+  </dgm:styleLbl>
+  <dgm:styleLbl name="fgAccFollowNode1">
+    <dgm:scene3d>
+      <a:camera prst="orthographicFront"/>
+      <a:lightRig rig="threePt" dir="t"/>
+    </dgm:scene3d>
+    <dgm:sp3d/>
+    <dgm:txPr/>
+    <dgm:style>
+      <a:lnRef idx="2">
+        <a:scrgbClr r="0" g="0" b="0"/>
+      </a:lnRef>
+      <a:fillRef idx="1">
+        <a:scrgbClr r="0" g="0" b="0"/>
+      </a:fillRef>
+      <a:effectRef idx="0">
+        <a:scrgbClr r="0" g="0" b="0"/>
+      </a:effectRef>
+      <a:fontRef idx="minor"/>
+    </dgm:style>
+  </dgm:styleLbl>
+  <dgm:styleLbl name="alignAccFollowNode1">
+    <dgm:scene3d>
+      <a:camera prst="orthographicFront"/>
+      <a:lightRig rig="threePt" dir="t"/>
+    </dgm:scene3d>
+    <dgm:sp3d/>
+    <dgm:txPr/>
+    <dgm:style>
+      <a:lnRef idx="2">
+        <a:scrgbClr r="0" g="0" b="0"/>
+      </a:lnRef>
+      <a:fillRef idx="1">
+        <a:scrgbClr r="0" g="0" b="0"/>
+      </a:fillRef>
+      <a:effectRef idx="0">
+        <a:scrgbClr r="0" g="0" b="0"/>
+      </a:effectRef>
+      <a:fontRef idx="minor"/>
+    </dgm:style>
+  </dgm:styleLbl>
+  <dgm:styleLbl name="bgAccFollowNode1">
+    <dgm:scene3d>
+      <a:camera prst="orthographicFront"/>
+      <a:lightRig rig="threePt" dir="t"/>
+    </dgm:scene3d>
+    <dgm:sp3d/>
+    <dgm:txPr/>
+    <dgm:style>
+      <a:lnRef idx="2">
+        <a:scrgbClr r="0" g="0" b="0"/>
+      </a:lnRef>
+      <a:fillRef idx="1">
+        <a:scrgbClr r="0" g="0" b="0"/>
+      </a:fillRef>
+      <a:effectRef idx="0">
+        <a:scrgbClr r="0" g="0" b="0"/>
+      </a:effectRef>
+      <a:fontRef idx="minor"/>
+    </dgm:style>
+  </dgm:styleLbl>
+  <dgm:styleLbl name="fgAcc0">
+    <dgm:scene3d>
+      <a:camera prst="orthographicFront"/>
+      <a:lightRig rig="threePt" dir="t"/>
+    </dgm:scene3d>
+    <dgm:sp3d/>
+    <dgm:txPr/>
+    <dgm:style>
+      <a:lnRef idx="2">
+        <a:scrgbClr r="0" g="0" b="0"/>
+      </a:lnRef>
+      <a:fillRef idx="1">
+        <a:scrgbClr r="0" g="0" b="0"/>
+      </a:fillRef>
+      <a:effectRef idx="0">
+        <a:scrgbClr r="0" g="0" b="0"/>
+      </a:effectRef>
+      <a:fontRef idx="minor"/>
+    </dgm:style>
+  </dgm:styleLbl>
+  <dgm:styleLbl name="fgAcc2">
+    <dgm:scene3d>
+      <a:camera prst="orthographicFront"/>
+      <a:lightRig rig="threePt" dir="t"/>
+    </dgm:scene3d>
+    <dgm:sp3d/>
+    <dgm:txPr/>
+    <dgm:style>
+      <a:lnRef idx="2">
+        <a:scrgbClr r="0" g="0" b="0"/>
+      </a:lnRef>
+      <a:fillRef idx="1">
+        <a:scrgbClr r="0" g="0" b="0"/>
+      </a:fillRef>
+      <a:effectRef idx="0">
+        <a:scrgbClr r="0" g="0" b="0"/>
+      </a:effectRef>
+      <a:fontRef idx="minor"/>
+    </dgm:style>
+  </dgm:styleLbl>
+  <dgm:styleLbl name="fgAcc3">
+    <dgm:scene3d>
+      <a:camera prst="orthographicFront"/>
+      <a:lightRig rig="threePt" dir="t"/>
+    </dgm:scene3d>
+    <dgm:sp3d/>
+    <dgm:txPr/>
+    <dgm:style>
+      <a:lnRef idx="2">
+        <a:scrgbClr r="0" g="0" b="0"/>
+      </a:lnRef>
+      <a:fillRef idx="1">
+        <a:scrgbClr r="0" g="0" b="0"/>
+      </a:fillRef>
+      <a:effectRef idx="0">
+        <a:scrgbClr r="0" g="0" b="0"/>
+      </a:effectRef>
+      <a:fontRef idx="minor"/>
+    </dgm:style>
+  </dgm:styleLbl>
+  <dgm:styleLbl name="fgAcc4">
+    <dgm:scene3d>
+      <a:camera prst="orthographicFront"/>
+      <a:lightRig rig="threePt" dir="t"/>
+    </dgm:scene3d>
+    <dgm:sp3d/>
+    <dgm:txPr/>
+    <dgm:style>
+      <a:lnRef idx="2">
+        <a:scrgbClr r="0" g="0" b="0"/>
+      </a:lnRef>
+      <a:fillRef idx="1">
+        <a:scrgbClr r="0" g="0" b="0"/>
+      </a:fillRef>
+      <a:effectRef idx="0">
+        <a:scrgbClr r="0" g="0" b="0"/>
+      </a:effectRef>
+      <a:fontRef idx="minor"/>
+    </dgm:style>
+  </dgm:styleLbl>
+  <dgm:styleLbl name="bgShp">
+    <dgm:scene3d>
+      <a:camera prst="orthographicFront"/>
+      <a:lightRig rig="threePt" dir="t"/>
+    </dgm:scene3d>
+    <dgm:sp3d/>
+    <dgm:txPr/>
+    <dgm:style>
+      <a:lnRef idx="0">
+        <a:scrgbClr r="0" g="0" b="0"/>
+      </a:lnRef>
+      <a:fillRef idx="1">
+        <a:scrgbClr r="0" g="0" b="0"/>
+      </a:fillRef>
+      <a:effectRef idx="0">
+        <a:scrgbClr r="0" g="0" b="0"/>
+      </a:effectRef>
+      <a:fontRef idx="minor"/>
+    </dgm:style>
+  </dgm:styleLbl>
+  <dgm:styleLbl name="dkBgShp">
+    <dgm:scene3d>
+      <a:camera prst="orthographicFront"/>
+      <a:lightRig rig="threePt" dir="t"/>
+    </dgm:scene3d>
+    <dgm:sp3d/>
+    <dgm:txPr/>
+    <dgm:style>
+      <a:lnRef idx="0">
+        <a:scrgbClr r="0" g="0" b="0"/>
+      </a:lnRef>
+      <a:fillRef idx="1">
+        <a:scrgbClr r="0" g="0" b="0"/>
+      </a:fillRef>
+      <a:effectRef idx="0">
+        <a:scrgbClr r="0" g="0" b="0"/>
+      </a:effectRef>
+      <a:fontRef idx="minor"/>
+    </dgm:style>
+  </dgm:styleLbl>
+  <dgm:styleLbl name="trBgShp">
+    <dgm:scene3d>
+      <a:camera prst="orthographicFront"/>
+      <a:lightRig rig="threePt" dir="t"/>
+    </dgm:scene3d>
+    <dgm:sp3d/>
+    <dgm:txPr/>
+    <dgm:style>
+      <a:lnRef idx="0">
+        <a:scrgbClr r="0" g="0" b="0"/>
+      </a:lnRef>
+      <a:fillRef idx="1">
+        <a:scrgbClr r="0" g="0" b="0"/>
+      </a:fillRef>
+      <a:effectRef idx="0">
+        <a:scrgbClr r="0" g="0" b="0"/>
+      </a:effectRef>
+      <a:fontRef idx="minor"/>
+    </dgm:style>
+  </dgm:styleLbl>
+  <dgm:styleLbl name="fgShp">
+    <dgm:scene3d>
+      <a:camera prst="orthographicFront"/>
+      <a:lightRig rig="threePt" dir="t"/>
+    </dgm:scene3d>
+    <dgm:sp3d/>
+    <dgm:txPr/>
+    <dgm:style>
+      <a:lnRef idx="2">
+        <a:scrgbClr r="0" g="0" b="0"/>
+      </a:lnRef>
+      <a:fillRef idx="1">
+        <a:scrgbClr r="0" g="0" b="0"/>
+      </a:fillRef>
+      <a:effectRef idx="0">
+        <a:scrgbClr r="0" g="0" b="0"/>
+      </a:effectRef>
+      <a:fontRef idx="minor"/>
+    </dgm:style>
+  </dgm:styleLbl>
+  <dgm:styleLbl name="revTx">
+    <dgm:scene3d>
+      <a:camera prst="orthographicFront"/>
+      <a:lightRig rig="threePt" dir="t"/>
+    </dgm:scene3d>
+    <dgm:sp3d/>
+    <dgm:txPr/>
+    <dgm:style>
+      <a:lnRef idx="0">
+        <a:scrgbClr r="0" g="0" b="0"/>
+      </a:lnRef>
+      <a:fillRef idx="0">
+        <a:scrgbClr r="0" g="0" b="0"/>
+      </a:fillRef>
+      <a:effectRef idx="0">
+        <a:scrgbClr r="0" g="0" b="0"/>
+      </a:effectRef>
+      <a:fontRef idx="minor"/>
+    </dgm:style>
+  </dgm:styleLbl>
+</dgm:styleDef>
+</file>
+
 <file path=ppt/slideLayouts/slideLayout1.xml><?xml version="1.0" encoding="utf-8"?>
 <p:sldLayout xmlns:a="http://schemas.openxmlformats.org/drawingml/2006/main" xmlns:r="http://schemas.openxmlformats.org/officeDocument/2006/relationships" xmlns:p="http://schemas.openxmlformats.org/presentationml/2006/main" type="title" preserve="1">
   <p:cSld name="Slide de título">
@@ -291,7 +2988,7 @@
           <a:p>
             <a:fld id="{E5F7A17C-2ABB-4B98-9602-90426F377FCE}" type="datetimeFigureOut">
               <a:rPr lang="pt-BR" smtClean="0"/>
-              <a:t>11/01/2015</a:t>
+              <a:t>13/01/2015</a:t>
             </a:fld>
             <a:endParaRPr lang="pt-BR"/>
           </a:p>
@@ -461,7 +3158,7 @@
           <a:p>
             <a:fld id="{E5F7A17C-2ABB-4B98-9602-90426F377FCE}" type="datetimeFigureOut">
               <a:rPr lang="pt-BR" smtClean="0"/>
-              <a:t>11/01/2015</a:t>
+              <a:t>13/01/2015</a:t>
             </a:fld>
             <a:endParaRPr lang="pt-BR"/>
           </a:p>
@@ -641,7 +3338,7 @@
           <a:p>
             <a:fld id="{E5F7A17C-2ABB-4B98-9602-90426F377FCE}" type="datetimeFigureOut">
               <a:rPr lang="pt-BR" smtClean="0"/>
-              <a:t>11/01/2015</a:t>
+              <a:t>13/01/2015</a:t>
             </a:fld>
             <a:endParaRPr lang="pt-BR"/>
           </a:p>
@@ -811,7 +3508,7 @@
           <a:p>
             <a:fld id="{E5F7A17C-2ABB-4B98-9602-90426F377FCE}" type="datetimeFigureOut">
               <a:rPr lang="pt-BR" smtClean="0"/>
-              <a:t>11/01/2015</a:t>
+              <a:t>13/01/2015</a:t>
             </a:fld>
             <a:endParaRPr lang="pt-BR"/>
           </a:p>
@@ -1057,7 +3754,7 @@
           <a:p>
             <a:fld id="{E5F7A17C-2ABB-4B98-9602-90426F377FCE}" type="datetimeFigureOut">
               <a:rPr lang="pt-BR" smtClean="0"/>
-              <a:t>11/01/2015</a:t>
+              <a:t>13/01/2015</a:t>
             </a:fld>
             <a:endParaRPr lang="pt-BR"/>
           </a:p>
@@ -1345,7 +4042,7 @@
           <a:p>
             <a:fld id="{E5F7A17C-2ABB-4B98-9602-90426F377FCE}" type="datetimeFigureOut">
               <a:rPr lang="pt-BR" smtClean="0"/>
-              <a:t>11/01/2015</a:t>
+              <a:t>13/01/2015</a:t>
             </a:fld>
             <a:endParaRPr lang="pt-BR"/>
           </a:p>
@@ -1767,7 +4464,7 @@
           <a:p>
             <a:fld id="{E5F7A17C-2ABB-4B98-9602-90426F377FCE}" type="datetimeFigureOut">
               <a:rPr lang="pt-BR" smtClean="0"/>
-              <a:t>11/01/2015</a:t>
+              <a:t>13/01/2015</a:t>
             </a:fld>
             <a:endParaRPr lang="pt-BR"/>
           </a:p>
@@ -1885,7 +4582,7 @@
           <a:p>
             <a:fld id="{E5F7A17C-2ABB-4B98-9602-90426F377FCE}" type="datetimeFigureOut">
               <a:rPr lang="pt-BR" smtClean="0"/>
-              <a:t>11/01/2015</a:t>
+              <a:t>13/01/2015</a:t>
             </a:fld>
             <a:endParaRPr lang="pt-BR"/>
           </a:p>
@@ -1980,7 +4677,7 @@
           <a:p>
             <a:fld id="{E5F7A17C-2ABB-4B98-9602-90426F377FCE}" type="datetimeFigureOut">
               <a:rPr lang="pt-BR" smtClean="0"/>
-              <a:t>11/01/2015</a:t>
+              <a:t>13/01/2015</a:t>
             </a:fld>
             <a:endParaRPr lang="pt-BR"/>
           </a:p>
@@ -2257,7 +4954,7 @@
           <a:p>
             <a:fld id="{E5F7A17C-2ABB-4B98-9602-90426F377FCE}" type="datetimeFigureOut">
               <a:rPr lang="pt-BR" smtClean="0"/>
-              <a:t>11/01/2015</a:t>
+              <a:t>13/01/2015</a:t>
             </a:fld>
             <a:endParaRPr lang="pt-BR"/>
           </a:p>
@@ -2510,7 +5207,7 @@
           <a:p>
             <a:fld id="{E5F7A17C-2ABB-4B98-9602-90426F377FCE}" type="datetimeFigureOut">
               <a:rPr lang="pt-BR" smtClean="0"/>
-              <a:t>11/01/2015</a:t>
+              <a:t>13/01/2015</a:t>
             </a:fld>
             <a:endParaRPr lang="pt-BR"/>
           </a:p>
@@ -2723,7 +5420,7 @@
           <a:p>
             <a:fld id="{E5F7A17C-2ABB-4B98-9602-90426F377FCE}" type="datetimeFigureOut">
               <a:rPr lang="pt-BR" smtClean="0"/>
-              <a:t>11/01/2015</a:t>
+              <a:t>13/01/2015</a:t>
             </a:fld>
             <a:endParaRPr lang="pt-BR"/>
           </a:p>
@@ -5888,6 +8585,949 @@
     <p:extLst>
       <p:ext uri="{BB962C8B-B14F-4D97-AF65-F5344CB8AC3E}">
         <p14:creationId xmlns:p14="http://schemas.microsoft.com/office/powerpoint/2010/main" val="521769142"/>
+      </p:ext>
+    </p:extLst>
+  </p:cSld>
+  <p:clrMapOvr>
+    <a:masterClrMapping/>
+  </p:clrMapOvr>
+</p:sld>
+</file>
+
+<file path=ppt/slides/slide5.xml><?xml version="1.0" encoding="utf-8"?>
+<p:sld xmlns:a="http://schemas.openxmlformats.org/drawingml/2006/main" xmlns:r="http://schemas.openxmlformats.org/officeDocument/2006/relationships" xmlns:p="http://schemas.openxmlformats.org/presentationml/2006/main">
+  <p:cSld>
+    <p:spTree>
+      <p:nvGrpSpPr>
+        <p:cNvPr id="1" name=""/>
+        <p:cNvGrpSpPr/>
+        <p:nvPr/>
+      </p:nvGrpSpPr>
+      <p:grpSpPr>
+        <a:xfrm>
+          <a:off x="0" y="0"/>
+          <a:ext cx="0" cy="0"/>
+          <a:chOff x="0" y="0"/>
+          <a:chExt cx="0" cy="0"/>
+        </a:xfrm>
+      </p:grpSpPr>
+      <p:graphicFrame>
+        <p:nvGraphicFramePr>
+          <p:cNvPr id="4" name="Diagrama 3"/>
+          <p:cNvGraphicFramePr/>
+          <p:nvPr>
+            <p:extLst>
+              <p:ext uri="{D42A27DB-BD31-4B8C-83A1-F6EECF244321}">
+                <p14:modId xmlns:p14="http://schemas.microsoft.com/office/powerpoint/2010/main" val="907325434"/>
+              </p:ext>
+            </p:extLst>
+          </p:nvPr>
+        </p:nvGraphicFramePr>
+        <p:xfrm>
+          <a:off x="2040048" y="268660"/>
+          <a:ext cx="4561141" cy="2758974"/>
+        </p:xfrm>
+        <a:graphic>
+          <a:graphicData uri="http://schemas.openxmlformats.org/drawingml/2006/diagram">
+            <dgm:relIds xmlns:dgm="http://schemas.openxmlformats.org/drawingml/2006/diagram" xmlns:r="http://schemas.openxmlformats.org/officeDocument/2006/relationships" r:dm="rId2" r:lo="rId3" r:qs="rId4" r:cs="rId5"/>
+          </a:graphicData>
+        </a:graphic>
+      </p:graphicFrame>
+      <p:grpSp>
+        <p:nvGrpSpPr>
+          <p:cNvPr id="17" name="Grupo 16"/>
+          <p:cNvGrpSpPr/>
+          <p:nvPr/>
+        </p:nvGrpSpPr>
+        <p:grpSpPr>
+          <a:xfrm>
+            <a:off x="2101884" y="3581028"/>
+            <a:ext cx="4466320" cy="2160240"/>
+            <a:chOff x="249696" y="3068960"/>
+            <a:chExt cx="4466320" cy="2160240"/>
+          </a:xfrm>
+        </p:grpSpPr>
+        <p:sp>
+          <p:nvSpPr>
+            <p:cNvPr id="5" name="Retângulo 4"/>
+            <p:cNvSpPr/>
+            <p:nvPr/>
+          </p:nvSpPr>
+          <p:spPr>
+            <a:xfrm>
+              <a:off x="251520" y="3068960"/>
+              <a:ext cx="4464496" cy="2160240"/>
+            </a:xfrm>
+            <a:prstGeom prst="rect">
+              <a:avLst/>
+            </a:prstGeom>
+            <a:solidFill>
+              <a:srgbClr val="FCD9BC"/>
+            </a:solidFill>
+            <a:ln>
+              <a:noFill/>
+            </a:ln>
+          </p:spPr>
+          <p:style>
+            <a:lnRef idx="2">
+              <a:schemeClr val="accent6">
+                <a:shade val="50000"/>
+              </a:schemeClr>
+            </a:lnRef>
+            <a:fillRef idx="1">
+              <a:schemeClr val="accent6"/>
+            </a:fillRef>
+            <a:effectRef idx="0">
+              <a:schemeClr val="accent6"/>
+            </a:effectRef>
+            <a:fontRef idx="minor">
+              <a:schemeClr val="lt1"/>
+            </a:fontRef>
+          </p:style>
+          <p:txBody>
+            <a:bodyPr rtlCol="0" anchor="ctr"/>
+            <a:lstStyle/>
+            <a:p>
+              <a:pPr algn="ctr"/>
+              <a:endParaRPr lang="pt-BR"/>
+            </a:p>
+          </p:txBody>
+        </p:sp>
+        <p:sp>
+          <p:nvSpPr>
+            <p:cNvPr id="14" name="Retângulo 13"/>
+            <p:cNvSpPr/>
+            <p:nvPr/>
+          </p:nvSpPr>
+          <p:spPr>
+            <a:xfrm>
+              <a:off x="251520" y="3068960"/>
+              <a:ext cx="4464496" cy="2016224"/>
+            </a:xfrm>
+            <a:custGeom>
+              <a:avLst/>
+              <a:gdLst>
+                <a:gd name="connsiteX0" fmla="*/ 0 w 4464496"/>
+                <a:gd name="connsiteY0" fmla="*/ 0 h 2016224"/>
+                <a:gd name="connsiteX1" fmla="*/ 4464496 w 4464496"/>
+                <a:gd name="connsiteY1" fmla="*/ 0 h 2016224"/>
+                <a:gd name="connsiteX2" fmla="*/ 4464496 w 4464496"/>
+                <a:gd name="connsiteY2" fmla="*/ 2016224 h 2016224"/>
+                <a:gd name="connsiteX3" fmla="*/ 0 w 4464496"/>
+                <a:gd name="connsiteY3" fmla="*/ 2016224 h 2016224"/>
+                <a:gd name="connsiteX4" fmla="*/ 0 w 4464496"/>
+                <a:gd name="connsiteY4" fmla="*/ 0 h 2016224"/>
+                <a:gd name="connsiteX0" fmla="*/ 0 w 4464496"/>
+                <a:gd name="connsiteY0" fmla="*/ 0 h 2016224"/>
+                <a:gd name="connsiteX1" fmla="*/ 4464496 w 4464496"/>
+                <a:gd name="connsiteY1" fmla="*/ 0 h 2016224"/>
+                <a:gd name="connsiteX2" fmla="*/ 4464496 w 4464496"/>
+                <a:gd name="connsiteY2" fmla="*/ 2016224 h 2016224"/>
+                <a:gd name="connsiteX3" fmla="*/ 2381 w 4464496"/>
+                <a:gd name="connsiteY3" fmla="*/ 1008955 h 2016224"/>
+                <a:gd name="connsiteX4" fmla="*/ 0 w 4464496"/>
+                <a:gd name="connsiteY4" fmla="*/ 0 h 2016224"/>
+                <a:gd name="connsiteX0" fmla="*/ 0 w 4464496"/>
+                <a:gd name="connsiteY0" fmla="*/ 0 h 2016224"/>
+                <a:gd name="connsiteX1" fmla="*/ 4464496 w 4464496"/>
+                <a:gd name="connsiteY1" fmla="*/ 0 h 2016224"/>
+                <a:gd name="connsiteX2" fmla="*/ 4464496 w 4464496"/>
+                <a:gd name="connsiteY2" fmla="*/ 2016224 h 2016224"/>
+                <a:gd name="connsiteX3" fmla="*/ 2381 w 4464496"/>
+                <a:gd name="connsiteY3" fmla="*/ 1618555 h 2016224"/>
+                <a:gd name="connsiteX4" fmla="*/ 0 w 4464496"/>
+                <a:gd name="connsiteY4" fmla="*/ 0 h 2016224"/>
+                <a:gd name="connsiteX0" fmla="*/ 5303 w 4469799"/>
+                <a:gd name="connsiteY0" fmla="*/ 0 h 2016224"/>
+                <a:gd name="connsiteX1" fmla="*/ 4469799 w 4469799"/>
+                <a:gd name="connsiteY1" fmla="*/ 0 h 2016224"/>
+                <a:gd name="connsiteX2" fmla="*/ 4469799 w 4469799"/>
+                <a:gd name="connsiteY2" fmla="*/ 2016224 h 2016224"/>
+                <a:gd name="connsiteX3" fmla="*/ 64 w 4469799"/>
+                <a:gd name="connsiteY3" fmla="*/ 1328995 h 2016224"/>
+                <a:gd name="connsiteX4" fmla="*/ 5303 w 4469799"/>
+                <a:gd name="connsiteY4" fmla="*/ 0 h 2016224"/>
+                <a:gd name="connsiteX0" fmla="*/ 0 w 4464496"/>
+                <a:gd name="connsiteY0" fmla="*/ 0 h 2016224"/>
+                <a:gd name="connsiteX1" fmla="*/ 4464496 w 4464496"/>
+                <a:gd name="connsiteY1" fmla="*/ 0 h 2016224"/>
+                <a:gd name="connsiteX2" fmla="*/ 4464496 w 4464496"/>
+                <a:gd name="connsiteY2" fmla="*/ 2016224 h 2016224"/>
+                <a:gd name="connsiteX3" fmla="*/ 1904 w 4464496"/>
+                <a:gd name="connsiteY3" fmla="*/ 1324233 h 2016224"/>
+                <a:gd name="connsiteX4" fmla="*/ 0 w 4464496"/>
+                <a:gd name="connsiteY4" fmla="*/ 0 h 2016224"/>
+              </a:gdLst>
+              <a:ahLst/>
+              <a:cxnLst>
+                <a:cxn ang="0">
+                  <a:pos x="connsiteX0" y="connsiteY0"/>
+                </a:cxn>
+                <a:cxn ang="0">
+                  <a:pos x="connsiteX1" y="connsiteY1"/>
+                </a:cxn>
+                <a:cxn ang="0">
+                  <a:pos x="connsiteX2" y="connsiteY2"/>
+                </a:cxn>
+                <a:cxn ang="0">
+                  <a:pos x="connsiteX3" y="connsiteY3"/>
+                </a:cxn>
+                <a:cxn ang="0">
+                  <a:pos x="connsiteX4" y="connsiteY4"/>
+                </a:cxn>
+              </a:cxnLst>
+              <a:rect l="l" t="t" r="r" b="b"/>
+              <a:pathLst>
+                <a:path w="4464496" h="2016224">
+                  <a:moveTo>
+                    <a:pt x="0" y="0"/>
+                  </a:moveTo>
+                  <a:lnTo>
+                    <a:pt x="4464496" y="0"/>
+                  </a:lnTo>
+                  <a:lnTo>
+                    <a:pt x="4464496" y="2016224"/>
+                  </a:lnTo>
+                  <a:lnTo>
+                    <a:pt x="1904" y="1324233"/>
+                  </a:lnTo>
+                  <a:cubicBezTo>
+                    <a:pt x="1110" y="987915"/>
+                    <a:pt x="794" y="336318"/>
+                    <a:pt x="0" y="0"/>
+                  </a:cubicBezTo>
+                  <a:close/>
+                </a:path>
+              </a:pathLst>
+            </a:custGeom>
+            <a:solidFill>
+              <a:srgbClr val="FBC69B"/>
+            </a:solidFill>
+            <a:ln>
+              <a:noFill/>
+            </a:ln>
+          </p:spPr>
+          <p:style>
+            <a:lnRef idx="2">
+              <a:schemeClr val="accent6">
+                <a:shade val="50000"/>
+              </a:schemeClr>
+            </a:lnRef>
+            <a:fillRef idx="1">
+              <a:schemeClr val="accent6"/>
+            </a:fillRef>
+            <a:effectRef idx="0">
+              <a:schemeClr val="accent6"/>
+            </a:effectRef>
+            <a:fontRef idx="minor">
+              <a:schemeClr val="lt1"/>
+            </a:fontRef>
+          </p:style>
+          <p:txBody>
+            <a:bodyPr rtlCol="0" anchor="ctr"/>
+            <a:lstStyle/>
+            <a:p>
+              <a:pPr algn="ctr"/>
+              <a:endParaRPr lang="pt-BR"/>
+            </a:p>
+          </p:txBody>
+        </p:sp>
+        <p:sp>
+          <p:nvSpPr>
+            <p:cNvPr id="15" name="Retângulo 14"/>
+            <p:cNvSpPr/>
+            <p:nvPr/>
+          </p:nvSpPr>
+          <p:spPr>
+            <a:xfrm>
+              <a:off x="250648" y="3068960"/>
+              <a:ext cx="4465367" cy="1872208"/>
+            </a:xfrm>
+            <a:custGeom>
+              <a:avLst/>
+              <a:gdLst>
+                <a:gd name="connsiteX0" fmla="*/ 0 w 4464496"/>
+                <a:gd name="connsiteY0" fmla="*/ 0 h 1872208"/>
+                <a:gd name="connsiteX1" fmla="*/ 4464496 w 4464496"/>
+                <a:gd name="connsiteY1" fmla="*/ 0 h 1872208"/>
+                <a:gd name="connsiteX2" fmla="*/ 4464496 w 4464496"/>
+                <a:gd name="connsiteY2" fmla="*/ 1872208 h 1872208"/>
+                <a:gd name="connsiteX3" fmla="*/ 0 w 4464496"/>
+                <a:gd name="connsiteY3" fmla="*/ 1872208 h 1872208"/>
+                <a:gd name="connsiteX4" fmla="*/ 0 w 4464496"/>
+                <a:gd name="connsiteY4" fmla="*/ 0 h 1872208"/>
+                <a:gd name="connsiteX0" fmla="*/ 8878 w 4473374"/>
+                <a:gd name="connsiteY0" fmla="*/ 0 h 1872208"/>
+                <a:gd name="connsiteX1" fmla="*/ 4473374 w 4473374"/>
+                <a:gd name="connsiteY1" fmla="*/ 0 h 1872208"/>
+                <a:gd name="connsiteX2" fmla="*/ 4473374 w 4473374"/>
+                <a:gd name="connsiteY2" fmla="*/ 1872208 h 1872208"/>
+                <a:gd name="connsiteX3" fmla="*/ 0 w 4473374"/>
+                <a:gd name="connsiteY3" fmla="*/ 913420 h 1872208"/>
+                <a:gd name="connsiteX4" fmla="*/ 8878 w 4473374"/>
+                <a:gd name="connsiteY4" fmla="*/ 0 h 1872208"/>
+                <a:gd name="connsiteX0" fmla="*/ 8878 w 4473374"/>
+                <a:gd name="connsiteY0" fmla="*/ 0 h 1872208"/>
+                <a:gd name="connsiteX1" fmla="*/ 4473374 w 4473374"/>
+                <a:gd name="connsiteY1" fmla="*/ 0 h 1872208"/>
+                <a:gd name="connsiteX2" fmla="*/ 4473374 w 4473374"/>
+                <a:gd name="connsiteY2" fmla="*/ 1872208 h 1872208"/>
+                <a:gd name="connsiteX3" fmla="*/ 0 w 4473374"/>
+                <a:gd name="connsiteY3" fmla="*/ 771377 h 1872208"/>
+                <a:gd name="connsiteX4" fmla="*/ 8878 w 4473374"/>
+                <a:gd name="connsiteY4" fmla="*/ 0 h 1872208"/>
+                <a:gd name="connsiteX0" fmla="*/ 2528 w 4467024"/>
+                <a:gd name="connsiteY0" fmla="*/ 0 h 1872208"/>
+                <a:gd name="connsiteX1" fmla="*/ 4467024 w 4467024"/>
+                <a:gd name="connsiteY1" fmla="*/ 0 h 1872208"/>
+                <a:gd name="connsiteX2" fmla="*/ 4467024 w 4467024"/>
+                <a:gd name="connsiteY2" fmla="*/ 1872208 h 1872208"/>
+                <a:gd name="connsiteX3" fmla="*/ 0 w 4467024"/>
+                <a:gd name="connsiteY3" fmla="*/ 730102 h 1872208"/>
+                <a:gd name="connsiteX4" fmla="*/ 2528 w 4467024"/>
+                <a:gd name="connsiteY4" fmla="*/ 0 h 1872208"/>
+                <a:gd name="connsiteX0" fmla="*/ 444 w 4464940"/>
+                <a:gd name="connsiteY0" fmla="*/ 0 h 1872208"/>
+                <a:gd name="connsiteX1" fmla="*/ 4464940 w 4464940"/>
+                <a:gd name="connsiteY1" fmla="*/ 0 h 1872208"/>
+                <a:gd name="connsiteX2" fmla="*/ 4464940 w 4464940"/>
+                <a:gd name="connsiteY2" fmla="*/ 1872208 h 1872208"/>
+                <a:gd name="connsiteX3" fmla="*/ 7441 w 4464940"/>
+                <a:gd name="connsiteY3" fmla="*/ 732484 h 1872208"/>
+                <a:gd name="connsiteX4" fmla="*/ 444 w 4464940"/>
+                <a:gd name="connsiteY4" fmla="*/ 0 h 1872208"/>
+                <a:gd name="connsiteX0" fmla="*/ 871 w 4465367"/>
+                <a:gd name="connsiteY0" fmla="*/ 0 h 1872208"/>
+                <a:gd name="connsiteX1" fmla="*/ 4465367 w 4465367"/>
+                <a:gd name="connsiteY1" fmla="*/ 0 h 1872208"/>
+                <a:gd name="connsiteX2" fmla="*/ 4465367 w 4465367"/>
+                <a:gd name="connsiteY2" fmla="*/ 1872208 h 1872208"/>
+                <a:gd name="connsiteX3" fmla="*/ 724 w 4465367"/>
+                <a:gd name="connsiteY3" fmla="*/ 732484 h 1872208"/>
+                <a:gd name="connsiteX4" fmla="*/ 871 w 4465367"/>
+                <a:gd name="connsiteY4" fmla="*/ 0 h 1872208"/>
+              </a:gdLst>
+              <a:ahLst/>
+              <a:cxnLst>
+                <a:cxn ang="0">
+                  <a:pos x="connsiteX0" y="connsiteY0"/>
+                </a:cxn>
+                <a:cxn ang="0">
+                  <a:pos x="connsiteX1" y="connsiteY1"/>
+                </a:cxn>
+                <a:cxn ang="0">
+                  <a:pos x="connsiteX2" y="connsiteY2"/>
+                </a:cxn>
+                <a:cxn ang="0">
+                  <a:pos x="connsiteX3" y="connsiteY3"/>
+                </a:cxn>
+                <a:cxn ang="0">
+                  <a:pos x="connsiteX4" y="connsiteY4"/>
+                </a:cxn>
+              </a:cxnLst>
+              <a:rect l="l" t="t" r="r" b="b"/>
+              <a:pathLst>
+                <a:path w="4465367" h="1872208">
+                  <a:moveTo>
+                    <a:pt x="871" y="0"/>
+                  </a:moveTo>
+                  <a:lnTo>
+                    <a:pt x="4465367" y="0"/>
+                  </a:lnTo>
+                  <a:lnTo>
+                    <a:pt x="4465367" y="1872208"/>
+                  </a:lnTo>
+                  <a:lnTo>
+                    <a:pt x="724" y="732484"/>
+                  </a:lnTo>
+                  <a:cubicBezTo>
+                    <a:pt x="3683" y="428011"/>
+                    <a:pt x="-2088" y="304473"/>
+                    <a:pt x="871" y="0"/>
+                  </a:cubicBezTo>
+                  <a:close/>
+                </a:path>
+              </a:pathLst>
+            </a:custGeom>
+            <a:solidFill>
+              <a:srgbClr val="F9B073"/>
+            </a:solidFill>
+            <a:ln>
+              <a:noFill/>
+            </a:ln>
+          </p:spPr>
+          <p:style>
+            <a:lnRef idx="2">
+              <a:schemeClr val="accent6">
+                <a:shade val="50000"/>
+              </a:schemeClr>
+            </a:lnRef>
+            <a:fillRef idx="1">
+              <a:schemeClr val="accent6"/>
+            </a:fillRef>
+            <a:effectRef idx="0">
+              <a:schemeClr val="accent6"/>
+            </a:effectRef>
+            <a:fontRef idx="minor">
+              <a:schemeClr val="lt1"/>
+            </a:fontRef>
+          </p:style>
+          <p:txBody>
+            <a:bodyPr rtlCol="0" anchor="ctr"/>
+            <a:lstStyle/>
+            <a:p>
+              <a:pPr algn="ctr"/>
+              <a:endParaRPr lang="pt-BR" dirty="0"/>
+            </a:p>
+          </p:txBody>
+        </p:sp>
+        <p:sp>
+          <p:nvSpPr>
+            <p:cNvPr id="16" name="Retângulo 15"/>
+            <p:cNvSpPr/>
+            <p:nvPr/>
+          </p:nvSpPr>
+          <p:spPr>
+            <a:xfrm>
+              <a:off x="249696" y="3072760"/>
+              <a:ext cx="4465448" cy="1724392"/>
+            </a:xfrm>
+            <a:custGeom>
+              <a:avLst/>
+              <a:gdLst>
+                <a:gd name="connsiteX0" fmla="*/ 0 w 4464496"/>
+                <a:gd name="connsiteY0" fmla="*/ 0 h 1724392"/>
+                <a:gd name="connsiteX1" fmla="*/ 4464496 w 4464496"/>
+                <a:gd name="connsiteY1" fmla="*/ 0 h 1724392"/>
+                <a:gd name="connsiteX2" fmla="*/ 4464496 w 4464496"/>
+                <a:gd name="connsiteY2" fmla="*/ 1724392 h 1724392"/>
+                <a:gd name="connsiteX3" fmla="*/ 0 w 4464496"/>
+                <a:gd name="connsiteY3" fmla="*/ 1724392 h 1724392"/>
+                <a:gd name="connsiteX4" fmla="*/ 0 w 4464496"/>
+                <a:gd name="connsiteY4" fmla="*/ 0 h 1724392"/>
+                <a:gd name="connsiteX0" fmla="*/ 0 w 4464496"/>
+                <a:gd name="connsiteY0" fmla="*/ 0 h 1724392"/>
+                <a:gd name="connsiteX1" fmla="*/ 4464496 w 4464496"/>
+                <a:gd name="connsiteY1" fmla="*/ 0 h 1724392"/>
+                <a:gd name="connsiteX2" fmla="*/ 4464496 w 4464496"/>
+                <a:gd name="connsiteY2" fmla="*/ 1724392 h 1724392"/>
+                <a:gd name="connsiteX3" fmla="*/ 22860 w 4464496"/>
+                <a:gd name="connsiteY3" fmla="*/ 284212 h 1724392"/>
+                <a:gd name="connsiteX4" fmla="*/ 0 w 4464496"/>
+                <a:gd name="connsiteY4" fmla="*/ 0 h 1724392"/>
+                <a:gd name="connsiteX0" fmla="*/ 952 w 4465448"/>
+                <a:gd name="connsiteY0" fmla="*/ 0 h 1724392"/>
+                <a:gd name="connsiteX1" fmla="*/ 4465448 w 4465448"/>
+                <a:gd name="connsiteY1" fmla="*/ 0 h 1724392"/>
+                <a:gd name="connsiteX2" fmla="*/ 4465448 w 4465448"/>
+                <a:gd name="connsiteY2" fmla="*/ 1724392 h 1724392"/>
+                <a:gd name="connsiteX3" fmla="*/ 0 w 4465448"/>
+                <a:gd name="connsiteY3" fmla="*/ 131812 h 1724392"/>
+                <a:gd name="connsiteX4" fmla="*/ 952 w 4465448"/>
+                <a:gd name="connsiteY4" fmla="*/ 0 h 1724392"/>
+              </a:gdLst>
+              <a:ahLst/>
+              <a:cxnLst>
+                <a:cxn ang="0">
+                  <a:pos x="connsiteX0" y="connsiteY0"/>
+                </a:cxn>
+                <a:cxn ang="0">
+                  <a:pos x="connsiteX1" y="connsiteY1"/>
+                </a:cxn>
+                <a:cxn ang="0">
+                  <a:pos x="connsiteX2" y="connsiteY2"/>
+                </a:cxn>
+                <a:cxn ang="0">
+                  <a:pos x="connsiteX3" y="connsiteY3"/>
+                </a:cxn>
+                <a:cxn ang="0">
+                  <a:pos x="connsiteX4" y="connsiteY4"/>
+                </a:cxn>
+              </a:cxnLst>
+              <a:rect l="l" t="t" r="r" b="b"/>
+              <a:pathLst>
+                <a:path w="4465448" h="1724392">
+                  <a:moveTo>
+                    <a:pt x="952" y="0"/>
+                  </a:moveTo>
+                  <a:lnTo>
+                    <a:pt x="4465448" y="0"/>
+                  </a:lnTo>
+                  <a:lnTo>
+                    <a:pt x="4465448" y="1724392"/>
+                  </a:lnTo>
+                  <a:lnTo>
+                    <a:pt x="0" y="131812"/>
+                  </a:lnTo>
+                  <a:cubicBezTo>
+                    <a:pt x="317" y="87875"/>
+                    <a:pt x="635" y="43937"/>
+                    <a:pt x="952" y="0"/>
+                  </a:cubicBezTo>
+                  <a:close/>
+                </a:path>
+              </a:pathLst>
+            </a:custGeom>
+            <a:ln>
+              <a:noFill/>
+            </a:ln>
+          </p:spPr>
+          <p:style>
+            <a:lnRef idx="2">
+              <a:schemeClr val="accent6">
+                <a:shade val="50000"/>
+              </a:schemeClr>
+            </a:lnRef>
+            <a:fillRef idx="1">
+              <a:schemeClr val="accent6"/>
+            </a:fillRef>
+            <a:effectRef idx="0">
+              <a:schemeClr val="accent6"/>
+            </a:effectRef>
+            <a:fontRef idx="minor">
+              <a:schemeClr val="lt1"/>
+            </a:fontRef>
+          </p:style>
+          <p:txBody>
+            <a:bodyPr rtlCol="0" anchor="ctr"/>
+            <a:lstStyle/>
+            <a:p>
+              <a:pPr algn="ctr"/>
+              <a:endParaRPr lang="pt-BR"/>
+            </a:p>
+          </p:txBody>
+        </p:sp>
+      </p:grpSp>
+      <p:sp>
+        <p:nvSpPr>
+          <p:cNvPr id="18" name="Texto explicativo em seta para baixo 17"/>
+          <p:cNvSpPr/>
+          <p:nvPr/>
+        </p:nvSpPr>
+        <p:spPr>
+          <a:xfrm>
+            <a:off x="2092584" y="3092212"/>
+            <a:ext cx="4484920" cy="432048"/>
+          </a:xfrm>
+          <a:prstGeom prst="downArrowCallout">
+            <a:avLst/>
+          </a:prstGeom>
+          <a:gradFill>
+            <a:gsLst>
+              <a:gs pos="56000">
+                <a:srgbClr val="F9B47B"/>
+              </a:gs>
+              <a:gs pos="0">
+                <a:srgbClr val="FCD9BC"/>
+              </a:gs>
+            </a:gsLst>
+            <a:lin ang="5400000" scaled="0"/>
+          </a:gradFill>
+          <a:ln>
+            <a:solidFill>
+              <a:srgbClr val="EA8C2E"/>
+            </a:solidFill>
+          </a:ln>
+        </p:spPr>
+        <p:style>
+          <a:lnRef idx="2">
+            <a:schemeClr val="accent6">
+              <a:shade val="50000"/>
+            </a:schemeClr>
+          </a:lnRef>
+          <a:fillRef idx="1">
+            <a:schemeClr val="accent6"/>
+          </a:fillRef>
+          <a:effectRef idx="0">
+            <a:schemeClr val="accent6"/>
+          </a:effectRef>
+          <a:fontRef idx="minor">
+            <a:schemeClr val="lt1"/>
+          </a:fontRef>
+        </p:style>
+        <p:txBody>
+          <a:bodyPr rtlCol="0" anchor="ctr"/>
+          <a:lstStyle/>
+          <a:p>
+            <a:pPr algn="ctr"/>
+            <a:endParaRPr lang="pt-BR"/>
+          </a:p>
+        </p:txBody>
+      </p:sp>
+      <p:sp>
+        <p:nvSpPr>
+          <p:cNvPr id="19" name="CaixaDeTexto 18"/>
+          <p:cNvSpPr txBox="1"/>
+          <p:nvPr/>
+        </p:nvSpPr>
+        <p:spPr>
+          <a:xfrm rot="1149899">
+            <a:off x="3347949" y="4024384"/>
+            <a:ext cx="1717008" cy="369332"/>
+          </a:xfrm>
+          <a:prstGeom prst="rect">
+            <a:avLst/>
+          </a:prstGeom>
+          <a:noFill/>
+        </p:spPr>
+        <p:txBody>
+          <a:bodyPr wrap="none" rtlCol="0">
+            <a:spAutoFit/>
+          </a:bodyPr>
+          <a:lstStyle/>
+          <a:p>
+            <a:r>
+              <a:rPr lang="pt-BR" dirty="0" smtClean="0">
+                <a:solidFill>
+                  <a:srgbClr val="333333"/>
+                </a:solidFill>
+              </a:rPr>
+              <a:t>Fatores Afetivos</a:t>
+            </a:r>
+            <a:endParaRPr lang="pt-BR" dirty="0">
+              <a:solidFill>
+                <a:srgbClr val="333333"/>
+              </a:solidFill>
+            </a:endParaRPr>
+          </a:p>
+        </p:txBody>
+      </p:sp>
+      <p:sp>
+        <p:nvSpPr>
+          <p:cNvPr id="20" name="CaixaDeTexto 19"/>
+          <p:cNvSpPr txBox="1"/>
+          <p:nvPr/>
+        </p:nvSpPr>
+        <p:spPr>
+          <a:xfrm rot="893194">
+            <a:off x="3339886" y="4404475"/>
+            <a:ext cx="1121397" cy="369332"/>
+          </a:xfrm>
+          <a:prstGeom prst="rect">
+            <a:avLst/>
+          </a:prstGeom>
+          <a:noFill/>
+        </p:spPr>
+        <p:txBody>
+          <a:bodyPr wrap="none" rtlCol="0">
+            <a:spAutoFit/>
+          </a:bodyPr>
+          <a:lstStyle/>
+          <a:p>
+            <a:r>
+              <a:rPr lang="pt-BR" dirty="0" smtClean="0">
+                <a:solidFill>
+                  <a:srgbClr val="333333"/>
+                </a:solidFill>
+              </a:rPr>
+              <a:t>Satisfação</a:t>
+            </a:r>
+            <a:endParaRPr lang="pt-BR" dirty="0">
+              <a:solidFill>
+                <a:srgbClr val="333333"/>
+              </a:solidFill>
+            </a:endParaRPr>
+          </a:p>
+        </p:txBody>
+      </p:sp>
+      <p:sp>
+        <p:nvSpPr>
+          <p:cNvPr id="21" name="CaixaDeTexto 20"/>
+          <p:cNvSpPr txBox="1"/>
+          <p:nvPr/>
+        </p:nvSpPr>
+        <p:spPr>
+          <a:xfrm rot="756116">
+            <a:off x="3246184" y="4765148"/>
+            <a:ext cx="1062278" cy="369332"/>
+          </a:xfrm>
+          <a:prstGeom prst="rect">
+            <a:avLst/>
+          </a:prstGeom>
+          <a:noFill/>
+        </p:spPr>
+        <p:txBody>
+          <a:bodyPr wrap="none" rtlCol="0">
+            <a:spAutoFit/>
+          </a:bodyPr>
+          <a:lstStyle/>
+          <a:p>
+            <a:r>
+              <a:rPr lang="pt-BR" dirty="0" smtClean="0">
+                <a:solidFill>
+                  <a:srgbClr val="333333"/>
+                </a:solidFill>
+              </a:rPr>
+              <a:t>Eficiência</a:t>
+            </a:r>
+            <a:endParaRPr lang="pt-BR" dirty="0">
+              <a:solidFill>
+                <a:srgbClr val="333333"/>
+              </a:solidFill>
+            </a:endParaRPr>
+          </a:p>
+        </p:txBody>
+      </p:sp>
+      <p:sp>
+        <p:nvSpPr>
+          <p:cNvPr id="22" name="CaixaDeTexto 21"/>
+          <p:cNvSpPr txBox="1"/>
+          <p:nvPr/>
+        </p:nvSpPr>
+        <p:spPr>
+          <a:xfrm rot="326510">
+            <a:off x="3234217" y="5186987"/>
+            <a:ext cx="880819" cy="369332"/>
+          </a:xfrm>
+          <a:prstGeom prst="rect">
+            <a:avLst/>
+          </a:prstGeom>
+          <a:noFill/>
+        </p:spPr>
+        <p:txBody>
+          <a:bodyPr wrap="none" rtlCol="0">
+            <a:spAutoFit/>
+          </a:bodyPr>
+          <a:lstStyle/>
+          <a:p>
+            <a:r>
+              <a:rPr lang="pt-BR" dirty="0" smtClean="0">
+                <a:solidFill>
+                  <a:srgbClr val="333333"/>
+                </a:solidFill>
+              </a:rPr>
+              <a:t>Eficácia</a:t>
+            </a:r>
+            <a:endParaRPr lang="pt-BR" dirty="0">
+              <a:solidFill>
+                <a:srgbClr val="333333"/>
+              </a:solidFill>
+            </a:endParaRPr>
+          </a:p>
+        </p:txBody>
+      </p:sp>
+      <p:sp>
+        <p:nvSpPr>
+          <p:cNvPr id="23" name="CaixaDeTexto 22"/>
+          <p:cNvSpPr txBox="1"/>
+          <p:nvPr/>
+        </p:nvSpPr>
+        <p:spPr>
+          <a:xfrm rot="16200000">
+            <a:off x="1074076" y="4521669"/>
+            <a:ext cx="1656223" cy="276999"/>
+          </a:xfrm>
+          <a:prstGeom prst="rect">
+            <a:avLst/>
+          </a:prstGeom>
+          <a:noFill/>
+        </p:spPr>
+        <p:txBody>
+          <a:bodyPr wrap="none" rtlCol="0">
+            <a:spAutoFit/>
+          </a:bodyPr>
+          <a:lstStyle/>
+          <a:p>
+            <a:r>
+              <a:rPr lang="pt-BR" sz="1200" b="1" dirty="0" smtClean="0">
+                <a:solidFill>
+                  <a:srgbClr val="333333"/>
+                </a:solidFill>
+              </a:rPr>
+              <a:t>Experiência do Usuário</a:t>
+            </a:r>
+            <a:endParaRPr lang="pt-BR" sz="1200" b="1" dirty="0">
+              <a:solidFill>
+                <a:srgbClr val="333333"/>
+              </a:solidFill>
+            </a:endParaRPr>
+          </a:p>
+        </p:txBody>
+      </p:sp>
+      <p:grpSp>
+        <p:nvGrpSpPr>
+          <p:cNvPr id="27" name="Grupo 26"/>
+          <p:cNvGrpSpPr/>
+          <p:nvPr/>
+        </p:nvGrpSpPr>
+        <p:grpSpPr>
+          <a:xfrm>
+            <a:off x="1403648" y="5789229"/>
+            <a:ext cx="1734770" cy="402694"/>
+            <a:chOff x="1510991" y="5927729"/>
+            <a:chExt cx="1734770" cy="402694"/>
+          </a:xfrm>
+        </p:grpSpPr>
+        <p:sp>
+          <p:nvSpPr>
+            <p:cNvPr id="24" name="CaixaDeTexto 23"/>
+            <p:cNvSpPr txBox="1"/>
+            <p:nvPr/>
+          </p:nvSpPr>
+          <p:spPr>
+            <a:xfrm>
+              <a:off x="1510991" y="6053424"/>
+              <a:ext cx="1734770" cy="276999"/>
+            </a:xfrm>
+            <a:prstGeom prst="rect">
+              <a:avLst/>
+            </a:prstGeom>
+            <a:noFill/>
+          </p:spPr>
+          <p:txBody>
+            <a:bodyPr wrap="none" rtlCol="0">
+              <a:spAutoFit/>
+            </a:bodyPr>
+            <a:lstStyle/>
+            <a:p>
+              <a:r>
+                <a:rPr lang="pt-BR" sz="1200" b="1" dirty="0" smtClean="0">
+                  <a:solidFill>
+                    <a:srgbClr val="333333"/>
+                  </a:solidFill>
+                </a:rPr>
+                <a:t>Produtos de “Escritório”</a:t>
+              </a:r>
+              <a:endParaRPr lang="pt-BR" sz="1200" b="1" dirty="0">
+                <a:solidFill>
+                  <a:srgbClr val="333333"/>
+                </a:solidFill>
+              </a:endParaRPr>
+            </a:p>
+          </p:txBody>
+        </p:sp>
+        <p:cxnSp>
+          <p:nvCxnSpPr>
+            <p:cNvPr id="26" name="Conector reto 25"/>
+            <p:cNvCxnSpPr/>
+            <p:nvPr/>
+          </p:nvCxnSpPr>
+          <p:spPr>
+            <a:xfrm flipV="1">
+              <a:off x="2378376" y="5927729"/>
+              <a:ext cx="0" cy="156175"/>
+            </a:xfrm>
+            <a:prstGeom prst="line">
+              <a:avLst/>
+            </a:prstGeom>
+            <a:ln w="28575">
+              <a:solidFill>
+                <a:srgbClr val="333333"/>
+              </a:solidFill>
+              <a:headEnd type="none" w="med" len="med"/>
+              <a:tailEnd type="arrow" w="med" len="med"/>
+            </a:ln>
+          </p:spPr>
+          <p:style>
+            <a:lnRef idx="1">
+              <a:schemeClr val="accent1"/>
+            </a:lnRef>
+            <a:fillRef idx="0">
+              <a:schemeClr val="accent1"/>
+            </a:fillRef>
+            <a:effectRef idx="0">
+              <a:schemeClr val="accent1"/>
+            </a:effectRef>
+            <a:fontRef idx="minor">
+              <a:schemeClr val="tx1"/>
+            </a:fontRef>
+          </p:style>
+        </p:cxnSp>
+      </p:grpSp>
+      <p:grpSp>
+        <p:nvGrpSpPr>
+          <p:cNvPr id="31" name="Grupo 30"/>
+          <p:cNvGrpSpPr/>
+          <p:nvPr/>
+        </p:nvGrpSpPr>
+        <p:grpSpPr>
+          <a:xfrm>
+            <a:off x="5868144" y="5789229"/>
+            <a:ext cx="1045735" cy="402694"/>
+            <a:chOff x="5841161" y="5789229"/>
+            <a:chExt cx="1045735" cy="402694"/>
+          </a:xfrm>
+        </p:grpSpPr>
+        <p:sp>
+          <p:nvSpPr>
+            <p:cNvPr id="29" name="CaixaDeTexto 28"/>
+            <p:cNvSpPr txBox="1"/>
+            <p:nvPr/>
+          </p:nvSpPr>
+          <p:spPr>
+            <a:xfrm>
+              <a:off x="5841161" y="5914924"/>
+              <a:ext cx="1045735" cy="276999"/>
+            </a:xfrm>
+            <a:prstGeom prst="rect">
+              <a:avLst/>
+            </a:prstGeom>
+            <a:noFill/>
+          </p:spPr>
+          <p:txBody>
+            <a:bodyPr wrap="none" rtlCol="0">
+              <a:spAutoFit/>
+            </a:bodyPr>
+            <a:lstStyle/>
+            <a:p>
+              <a:r>
+                <a:rPr lang="pt-BR" sz="1200" b="1" dirty="0" smtClean="0">
+                  <a:solidFill>
+                    <a:srgbClr val="333333"/>
+                  </a:solidFill>
+                </a:rPr>
+                <a:t>Jogos Digitais</a:t>
+              </a:r>
+              <a:endParaRPr lang="pt-BR" sz="1200" b="1" dirty="0">
+                <a:solidFill>
+                  <a:srgbClr val="333333"/>
+                </a:solidFill>
+              </a:endParaRPr>
+            </a:p>
+          </p:txBody>
+        </p:sp>
+        <p:cxnSp>
+          <p:nvCxnSpPr>
+            <p:cNvPr id="30" name="Conector reto 29"/>
+            <p:cNvCxnSpPr/>
+            <p:nvPr/>
+          </p:nvCxnSpPr>
+          <p:spPr>
+            <a:xfrm flipV="1">
+              <a:off x="6364029" y="5789229"/>
+              <a:ext cx="0" cy="156175"/>
+            </a:xfrm>
+            <a:prstGeom prst="line">
+              <a:avLst/>
+            </a:prstGeom>
+            <a:ln w="28575">
+              <a:solidFill>
+                <a:srgbClr val="333333"/>
+              </a:solidFill>
+              <a:headEnd type="none" w="med" len="med"/>
+              <a:tailEnd type="arrow" w="med" len="med"/>
+            </a:ln>
+          </p:spPr>
+          <p:style>
+            <a:lnRef idx="1">
+              <a:schemeClr val="accent1"/>
+            </a:lnRef>
+            <a:fillRef idx="0">
+              <a:schemeClr val="accent1"/>
+            </a:fillRef>
+            <a:effectRef idx="0">
+              <a:schemeClr val="accent1"/>
+            </a:effectRef>
+            <a:fontRef idx="minor">
+              <a:schemeClr val="tx1"/>
+            </a:fontRef>
+          </p:style>
+        </p:cxnSp>
+      </p:grpSp>
+    </p:spTree>
+    <p:extLst>
+      <p:ext uri="{BB962C8B-B14F-4D97-AF65-F5344CB8AC3E}">
+        <p14:creationId xmlns:p14="http://schemas.microsoft.com/office/powerpoint/2010/main" val="3411874316"/>
       </p:ext>
     </p:extLst>
   </p:cSld>

</xml_diff>